<commit_message>
Renamed qr code images, so that they are specific to the overview
</commit_message>
<xml_diff>
--- a/LDDTesting/stone-LDDTestingOverview.pptx
+++ b/LDDTesting/stone-LDDTestingOverview.pptx
@@ -5511,14 +5511,14 @@
               <a:rPr>
                 <a:hlinkClick r:id="rId2"/>
               </a:rPr>
-              <a:t>https://sbn-psi.github.io/dmsp/LDDTesting/LDDTestingPrinciples</a:t>
+              <a:t>https://sbn-psi.github.io/dmsp/LDDTesting/LDDTestingOverview</a:t>
             </a:r>
           </a:p>
         </p:txBody>
       </p:sp>
       <p:pic>
         <p:nvPicPr>
-          <p:cNvPr descr="fig:  images/qr/site.png" id="0" name="Picture 1"/>
+          <p:cNvPr descr="fig:  images/qr/overview_page.png" id="0" name="Picture 1"/>
           <p:cNvPicPr>
             <a:picLocks noGrp="1" noChangeAspect="1"/>
           </p:cNvPicPr>
@@ -5744,14 +5744,14 @@
               <a:rPr>
                 <a:hlinkClick r:id="rId2"/>
               </a:rPr>
-              <a:t>https://github.com/sbn-psi/dmsp/raw/main/LDDTesting/stone-LDDTestingPrinciples.pptx</a:t>
+              <a:t>https://github.com/sbn-psi/dmsp/raw/main/LDDTesting/stone-LDDTestingOverview.pptx</a:t>
             </a:r>
           </a:p>
         </p:txBody>
       </p:sp>
       <p:pic>
         <p:nvPicPr>
-          <p:cNvPr descr="fig:  images/qr/presentation.png" id="0" name="Picture 1"/>
+          <p:cNvPr descr="fig:  images/qr/overview_presentation.png" id="0" name="Picture 1"/>
           <p:cNvPicPr>
             <a:picLocks noGrp="1" noChangeAspect="1"/>
           </p:cNvPicPr>

</xml_diff>

<commit_message>
Created secondary techniques presentation, updated separate assets
</commit_message>
<xml_diff>
--- a/LDDTesting/stone-LDDTestingOverview.pptx
+++ b/LDDTesting/stone-LDDTestingOverview.pptx
@@ -3306,7 +3306,7 @@
       </p:sp>
       <p:pic>
         <p:nvPicPr>
-          <p:cNvPr descr="fig:  images/qr/ldd-disp.png" id="0" name="Picture 1"/>
+          <p:cNvPr descr="fig:  images/common/ldd-disp.png" id="0" name="Picture 1"/>
           <p:cNvPicPr>
             <a:picLocks noGrp="1" noChangeAspect="1"/>
           </p:cNvPicPr>
@@ -3772,7 +3772,7 @@
       </p:sp>
       <p:pic>
         <p:nvPicPr>
-          <p:cNvPr descr="fig:  images/qr/ldd-survey.png" id="0" name="Picture 1"/>
+          <p:cNvPr descr="fig:  images/common/ldd-survey.png" id="0" name="Picture 1"/>
           <p:cNvPicPr>
             <a:picLocks noGrp="1" noChangeAspect="1"/>
           </p:cNvPicPr>
@@ -4043,7 +4043,7 @@
       </p:sp>
       <p:pic>
         <p:nvPicPr>
-          <p:cNvPr descr="fig:  images/qr/generator.png" id="0" name="Picture 1"/>
+          <p:cNvPr descr="fig:  images/common/generator.png" id="0" name="Picture 1"/>
           <p:cNvPicPr>
             <a:picLocks noGrp="1" noChangeAspect="1"/>
           </p:cNvPicPr>
@@ -4285,7 +4285,7 @@
       </p:sp>
       <p:pic>
         <p:nvPicPr>
-          <p:cNvPr descr="fig:  images/qr/ldd-spectral.png" id="0" name="Picture 1"/>
+          <p:cNvPr descr="fig:  images/common/ldd-spectral.png" id="0" name="Picture 1"/>
           <p:cNvPicPr>
             <a:picLocks noGrp="1" noChangeAspect="1"/>
           </p:cNvPicPr>
@@ -4934,7 +4934,7 @@
       </p:sp>
       <p:pic>
         <p:nvPicPr>
-          <p:cNvPr descr="fig:  images/qr/ldd-nucspec.png" id="0" name="Picture 1"/>
+          <p:cNvPr descr="fig:  images/common/ldd-nucspec.png" id="0" name="Picture 1"/>
           <p:cNvPicPr>
             <a:picLocks noGrp="1" noChangeAspect="1"/>
           </p:cNvPicPr>
@@ -5367,7 +5367,7 @@
       </p:sp>
       <p:pic>
         <p:nvPicPr>
-          <p:cNvPr descr="fig:  images/qr/preflight.png" id="0" name="Picture 1"/>
+          <p:cNvPr descr="fig:  images/common/preflight.png" id="0" name="Picture 1"/>
           <p:cNvPicPr>
             <a:picLocks noGrp="1" noChangeAspect="1"/>
           </p:cNvPicPr>
@@ -5518,7 +5518,7 @@
       </p:sp>
       <p:pic>
         <p:nvPicPr>
-          <p:cNvPr descr="fig:  images/qr/overview_page.png" id="0" name="Picture 1"/>
+          <p:cNvPr descr="fig:  images/overview/page.png" id="0" name="Picture 1"/>
           <p:cNvPicPr>
             <a:picLocks noGrp="1" noChangeAspect="1"/>
           </p:cNvPicPr>
@@ -5751,7 +5751,7 @@
       </p:sp>
       <p:pic>
         <p:nvPicPr>
-          <p:cNvPr descr="fig:  images/qr/overview_presentation.png" id="0" name="Picture 1"/>
+          <p:cNvPr descr="fig:  images/overview/presentation.png" id="0" name="Picture 1"/>
           <p:cNvPicPr>
             <a:picLocks noGrp="1" noChangeAspect="1"/>
           </p:cNvPicPr>

</xml_diff>

<commit_message>
Divided up slides between each presentation
</commit_message>
<xml_diff>
--- a/LDDTesting/stone-LDDTestingOverview.pptx
+++ b/LDDTesting/stone-LDDTestingOverview.pptx
@@ -19,22 +19,6 @@
     <p:sldId id="267" r:id="rId13"/>
     <p:sldId id="268" r:id="rId14"/>
     <p:sldId id="269" r:id="rId15"/>
-    <p:sldId id="270" r:id="rId16"/>
-    <p:sldId id="271" r:id="rId17"/>
-    <p:sldId id="272" r:id="rId18"/>
-    <p:sldId id="273" r:id="rId19"/>
-    <p:sldId id="274" r:id="rId20"/>
-    <p:sldId id="275" r:id="rId21"/>
-    <p:sldId id="276" r:id="rId22"/>
-    <p:sldId id="277" r:id="rId23"/>
-    <p:sldId id="278" r:id="rId24"/>
-    <p:sldId id="279" r:id="rId25"/>
-    <p:sldId id="280" r:id="rId26"/>
-    <p:sldId id="281" r:id="rId27"/>
-    <p:sldId id="282" r:id="rId28"/>
-    <p:sldId id="283" r:id="rId29"/>
-    <p:sldId id="284" r:id="rId30"/>
-    <p:sldId id="285" r:id="rId31"/>
   </p:sldIdLst>
   <p:sldSz cx="9144000" cy="5143500" type="screen16x9"/>
   <p:notesSz cx="6858000" cy="9144000"/>
@@ -3406,7 +3390,7 @@
             </a:pPr>
             <a:r>
               <a:rPr/>
-              <a:t>Keeping labels uniform</a:t>
+              <a:t>Static analysis tools</a:t>
             </a:r>
           </a:p>
         </p:txBody>
@@ -3429,14 +3413,49 @@
             <a:pPr lvl="0"/>
             <a:r>
               <a:rPr/>
-              <a:t>Unnecessary variations in the label will make it more difficult to track down errors.</a:t>
+              <a:t>Validate tool</a:t>
+            </a:r>
+          </a:p>
+          <a:p>
+            <a:pPr lvl="1"/>
+            <a:r>
+              <a:rPr/>
+              <a:t>Ingest LDD files are part of the PDS4 information model, just like products. This means that the validator can run against them.</a:t>
             </a:r>
           </a:p>
           <a:p>
             <a:pPr lvl="0"/>
             <a:r>
               <a:rPr/>
-              <a:t>Sometimes variations are necessary when a discipline area can apply to different data types</a:t>
+              <a:t>LDDTool</a:t>
+            </a:r>
+          </a:p>
+          <a:p>
+            <a:pPr lvl="1"/>
+            <a:r>
+              <a:rPr/>
+              <a:t>Catches many problems with a dictionary while it is being generated.</a:t>
+            </a:r>
+          </a:p>
+          <a:p>
+            <a:pPr lvl="0"/>
+            <a:r>
+              <a:rPr/>
+              <a:t>LDDPreflight</a:t>
+            </a:r>
+          </a:p>
+          <a:p>
+            <a:pPr lvl="1"/>
+            <a:r>
+              <a:rPr/>
+              <a:t>Runs several of the new rules proposed at this meeting, and raises any voilations.</a:t>
+            </a:r>
+          </a:p>
+          <a:p>
+            <a:pPr lvl="0"/>
+            <a:r>
+              <a:rPr/>
+              <a:t>These should be run before the regression tests, since errors at this point are easier to catch, and some of them will prevent the dictionary from being generated, or will prevent regression tests from passing.</a:t>
             </a:r>
           </a:p>
         </p:txBody>
@@ -3447,1832 +3466,6 @@
 </file>
 
 <file path=ppt/slides/slide12.xml><?xml version="1.0" encoding="utf-8"?>
-<p:sld xmlns:a="http://schemas.openxmlformats.org/drawingml/2006/main" xmlns:r="http://schemas.openxmlformats.org/officeDocument/2006/relationships" xmlns:p="http://schemas.openxmlformats.org/presentationml/2006/main">
-  <p:cSld>
-    <p:spTree>
-      <p:nvGrpSpPr>
-        <p:cNvPr id="1" name=""/>
-        <p:cNvGrpSpPr/>
-        <p:nvPr/>
-      </p:nvGrpSpPr>
-      <p:grpSpPr>
-        <a:xfrm>
-          <a:off x="0" y="0"/>
-          <a:ext cx="0" cy="0"/>
-          <a:chOff x="0" y="0"/>
-          <a:chExt cx="0" cy="0"/>
-        </a:xfrm>
-      </p:grpSpPr>
-      <p:sp>
-        <p:nvSpPr>
-          <p:cNvPr id="2" name="Title 1"/>
-          <p:cNvSpPr>
-            <a:spLocks noGrp="1"/>
-          </p:cNvSpPr>
-          <p:nvPr>
-            <p:ph type="title"/>
-          </p:nvPr>
-        </p:nvSpPr>
-        <p:spPr/>
-        <p:txBody>
-          <a:bodyPr/>
-          <a:lstStyle/>
-          <a:p>
-            <a:pPr lvl="0" indent="0" marL="0">
-              <a:buNone/>
-            </a:pPr>
-            <a:r>
-              <a:rPr/>
-              <a:t>Monolithic tests vs granular tests</a:t>
-            </a:r>
-          </a:p>
-        </p:txBody>
-      </p:sp>
-      <p:sp>
-        <p:nvSpPr>
-          <p:cNvPr id="3" name="Content Placeholder 2"/>
-          <p:cNvSpPr>
-            <a:spLocks noGrp="1"/>
-          </p:cNvSpPr>
-          <p:nvPr>
-            <p:ph idx="1"/>
-          </p:nvPr>
-        </p:nvSpPr>
-        <p:spPr/>
-        <p:txBody>
-          <a:bodyPr/>
-          <a:lstStyle/>
-          <a:p>
-            <a:pPr lvl="0"/>
-            <a:r>
-              <a:rPr/>
-              <a:t>EN’s test processes are currently better suited for granular tests</a:t>
-            </a:r>
-          </a:p>
-          <a:p>
-            <a:pPr lvl="0"/>
-            <a:r>
-              <a:rPr/>
-              <a:t>Monolithic tests are currently easier to generate and maintain</a:t>
-            </a:r>
-          </a:p>
-        </p:txBody>
-      </p:sp>
-    </p:spTree>
-  </p:cSld>
-</p:sld>
-</file>
-
-<file path=ppt/slides/slide13.xml><?xml version="1.0" encoding="utf-8"?>
-<p:sld xmlns:a="http://schemas.openxmlformats.org/drawingml/2006/main" xmlns:r="http://schemas.openxmlformats.org/officeDocument/2006/relationships" xmlns:p="http://schemas.openxmlformats.org/presentationml/2006/main">
-  <p:cSld>
-    <p:spTree>
-      <p:nvGrpSpPr>
-        <p:cNvPr id="1" name=""/>
-        <p:cNvGrpSpPr/>
-        <p:nvPr/>
-      </p:nvGrpSpPr>
-      <p:grpSpPr>
-        <a:xfrm>
-          <a:off x="0" y="0"/>
-          <a:ext cx="0" cy="0"/>
-          <a:chOff x="0" y="0"/>
-          <a:chExt cx="0" cy="0"/>
-        </a:xfrm>
-      </p:grpSpPr>
-      <p:sp>
-        <p:nvSpPr>
-          <p:cNvPr id="2" name="Title 1"/>
-          <p:cNvSpPr>
-            <a:spLocks noGrp="1"/>
-          </p:cNvSpPr>
-          <p:nvPr>
-            <p:ph type="title"/>
-          </p:nvPr>
-        </p:nvSpPr>
-        <p:spPr/>
-        <p:txBody>
-          <a:bodyPr/>
-          <a:lstStyle/>
-          <a:p>
-            <a:pPr lvl="0" indent="0" marL="0">
-              <a:buNone/>
-            </a:pPr>
-            <a:r>
-              <a:rPr/>
-              <a:t>Keeping tests granular</a:t>
-            </a:r>
-          </a:p>
-        </p:txBody>
-      </p:sp>
-      <p:sp>
-        <p:nvSpPr>
-          <p:cNvPr id="3" name="Content Placeholder 2"/>
-          <p:cNvSpPr>
-            <a:spLocks noGrp="1"/>
-          </p:cNvSpPr>
-          <p:nvPr>
-            <p:ph idx="1"/>
-          </p:nvPr>
-        </p:nvSpPr>
-        <p:spPr/>
-        <p:txBody>
-          <a:bodyPr/>
-          <a:lstStyle/>
-          <a:p>
-            <a:pPr lvl="0"/>
-            <a:r>
-              <a:rPr/>
-              <a:t>Each label is invalid in only one way</a:t>
-            </a:r>
-          </a:p>
-          <a:p>
-            <a:pPr lvl="0"/>
-            <a:r>
-              <a:rPr/>
-              <a:t>Combining multiple errors in a single file will mask errors that don’t occur, since the testing framework is binary.</a:t>
-            </a:r>
-          </a:p>
-        </p:txBody>
-      </p:sp>
-    </p:spTree>
-  </p:cSld>
-</p:sld>
-</file>
-
-<file path=ppt/slides/slide14.xml><?xml version="1.0" encoding="utf-8"?>
-<p:sld xmlns:a="http://schemas.openxmlformats.org/drawingml/2006/main" xmlns:r="http://schemas.openxmlformats.org/officeDocument/2006/relationships" xmlns:p="http://schemas.openxmlformats.org/presentationml/2006/main">
-  <p:cSld>
-    <p:spTree>
-      <p:nvGrpSpPr>
-        <p:cNvPr id="1" name=""/>
-        <p:cNvGrpSpPr/>
-        <p:nvPr/>
-      </p:nvGrpSpPr>
-      <p:grpSpPr>
-        <a:xfrm>
-          <a:off x="0" y="0"/>
-          <a:ext cx="0" cy="0"/>
-          <a:chOff x="0" y="0"/>
-          <a:chExt cx="0" cy="0"/>
-        </a:xfrm>
-      </p:grpSpPr>
-      <p:sp>
-        <p:nvSpPr>
-          <p:cNvPr id="2" name="Title 1"/>
-          <p:cNvSpPr>
-            <a:spLocks noGrp="1"/>
-          </p:cNvSpPr>
-          <p:nvPr>
-            <p:ph type="title"/>
-          </p:nvPr>
-        </p:nvSpPr>
-        <p:spPr/>
-        <p:txBody>
-          <a:bodyPr/>
-          <a:lstStyle/>
-          <a:p>
-            <a:pPr lvl="0" indent="0" marL="0">
-              <a:buNone/>
-            </a:pPr>
-            <a:r>
-              <a:rPr/>
-              <a:t>Drawbacks to granular tests</a:t>
-            </a:r>
-          </a:p>
-        </p:txBody>
-      </p:sp>
-      <p:sp>
-        <p:nvSpPr>
-          <p:cNvPr id="3" name="Content Placeholder 2"/>
-          <p:cNvSpPr>
-            <a:spLocks noGrp="1"/>
-          </p:cNvSpPr>
-          <p:nvPr>
-            <p:ph idx="1"/>
-          </p:nvPr>
-        </p:nvSpPr>
-        <p:spPr/>
-        <p:txBody>
-          <a:bodyPr/>
-          <a:lstStyle/>
-          <a:p>
-            <a:pPr lvl="0"/>
-            <a:r>
-              <a:rPr/>
-              <a:t>Granular tests will increase the number of labels that the LDD is tested against</a:t>
-            </a:r>
-          </a:p>
-          <a:p>
-            <a:pPr lvl="0"/>
-            <a:r>
-              <a:rPr/>
-              <a:t>Each of these labels will need to be maintained individually</a:t>
-            </a:r>
-          </a:p>
-        </p:txBody>
-      </p:sp>
-    </p:spTree>
-  </p:cSld>
-</p:sld>
-</file>
-
-<file path=ppt/slides/slide15.xml><?xml version="1.0" encoding="utf-8"?>
-<p:sld xmlns:a="http://schemas.openxmlformats.org/drawingml/2006/main" xmlns:r="http://schemas.openxmlformats.org/officeDocument/2006/relationships" xmlns:p="http://schemas.openxmlformats.org/presentationml/2006/main">
-  <p:cSld>
-    <p:spTree>
-      <p:nvGrpSpPr>
-        <p:cNvPr id="1" name=""/>
-        <p:cNvGrpSpPr/>
-        <p:nvPr/>
-      </p:nvGrpSpPr>
-      <p:grpSpPr>
-        <a:xfrm>
-          <a:off x="0" y="0"/>
-          <a:ext cx="0" cy="0"/>
-          <a:chOff x="0" y="0"/>
-          <a:chExt cx="0" cy="0"/>
-        </a:xfrm>
-      </p:grpSpPr>
-      <p:sp>
-        <p:nvSpPr>
-          <p:cNvPr id="2" name="Title 1"/>
-          <p:cNvSpPr>
-            <a:spLocks noGrp="1"/>
-          </p:cNvSpPr>
-          <p:nvPr>
-            <p:ph type="title"/>
-          </p:nvPr>
-        </p:nvSpPr>
-        <p:spPr>
-          <a:xfrm>
-            <a:off x="457201" y="204787"/>
-            <a:ext cx="3008313" cy="871538"/>
-          </a:xfrm>
-        </p:spPr>
-        <p:txBody>
-          <a:bodyPr/>
-          <a:lstStyle/>
-          <a:p>
-            <a:pPr lvl="0" indent="0" marL="0">
-              <a:buNone/>
-            </a:pPr>
-            <a:r>
-              <a:rPr/>
-              <a:t>Demonstration - Survey Dictionary Tests</a:t>
-            </a:r>
-          </a:p>
-        </p:txBody>
-      </p:sp>
-      <p:sp>
-        <p:nvSpPr>
-          <p:cNvPr id="4" name="Text Placeholder 3"/>
-          <p:cNvSpPr>
-            <a:spLocks noGrp="1"/>
-          </p:cNvSpPr>
-          <p:nvPr>
-            <p:ph idx="2" sz="half" type="body"/>
-          </p:nvPr>
-        </p:nvSpPr>
-        <p:spPr/>
-        <p:txBody>
-          <a:bodyPr/>
-          <a:lstStyle/>
-          <a:p>
-            <a:pPr lvl="0" indent="0" marL="0">
-              <a:buNone/>
-            </a:pPr>
-            <a:r>
-              <a:rPr>
-                <a:hlinkClick r:id="rId2"/>
-              </a:rPr>
-              <a:t>https://github.com/pds-data-dictionaries/ldd-survey/tree/main/test</a:t>
-            </a:r>
-          </a:p>
-          <a:p>
-            <a:pPr lvl="0" indent="0" marL="0">
-              <a:spcBef>
-                <a:spcPts val="3000"/>
-              </a:spcBef>
-              <a:buNone/>
-            </a:pPr>
-            <a:r>
-              <a:rPr b="1"/>
-              <a:t>Objectives</a:t>
-            </a:r>
-          </a:p>
-          <a:p>
-            <a:pPr lvl="0"/>
-            <a:r>
-              <a:rPr/>
-              <a:t>Demonstrate granular tests</a:t>
-            </a:r>
-          </a:p>
-        </p:txBody>
-      </p:sp>
-      <p:pic>
-        <p:nvPicPr>
-          <p:cNvPr descr="fig:  images/common/ldd-survey.png" id="0" name="Picture 1"/>
-          <p:cNvPicPr>
-            <a:picLocks noGrp="1" noChangeAspect="1"/>
-          </p:cNvPicPr>
-          <p:nvPr/>
-        </p:nvPicPr>
-        <p:blipFill>
-          <a:blip r:embed="rId3"/>
-          <a:stretch>
-            <a:fillRect/>
-          </a:stretch>
-        </p:blipFill>
-        <p:spPr bwMode="auto">
-          <a:xfrm>
-            <a:off x="4191000" y="203200"/>
-            <a:ext cx="3873500" cy="3873500"/>
-          </a:xfrm>
-          <a:prstGeom prst="rect">
-            <a:avLst/>
-          </a:prstGeom>
-          <a:noFill/>
-          <a:ln w="9525">
-            <a:noFill/>
-            <a:headEnd/>
-            <a:tailEnd/>
-          </a:ln>
-        </p:spPr>
-      </p:pic>
-      <p:sp>
-        <p:nvSpPr>
-          <p:cNvPr id="1" name="TextBox 3"/>
-          <p:cNvSpPr txBox="1"/>
-          <p:nvPr/>
-        </p:nvSpPr>
-        <p:spPr>
-          <a:xfrm>
-            <a:off x="3568700" y="4076700"/>
-            <a:ext cx="5105400" cy="508000"/>
-          </a:xfrm>
-          <a:prstGeom prst="rect">
-            <a:avLst/>
-          </a:prstGeom>
-          <a:noFill/>
-        </p:spPr>
-        <p:txBody>
-          <a:bodyPr/>
-          <a:lstStyle/>
-          <a:p>
-            <a:pPr lvl="0" indent="0" marL="0" algn="ctr">
-              <a:buNone/>
-            </a:pPr>
-            <a:r>
-              <a:rPr/>
-              <a:t>ldd-survey</a:t>
-            </a:r>
-          </a:p>
-        </p:txBody>
-      </p:sp>
-    </p:spTree>
-  </p:cSld>
-</p:sld>
-</file>
-
-<file path=ppt/slides/slide16.xml><?xml version="1.0" encoding="utf-8"?>
-<p:sld xmlns:a="http://schemas.openxmlformats.org/drawingml/2006/main" xmlns:r="http://schemas.openxmlformats.org/officeDocument/2006/relationships" xmlns:p="http://schemas.openxmlformats.org/presentationml/2006/main">
-  <p:cSld>
-    <p:spTree>
-      <p:nvGrpSpPr>
-        <p:cNvPr id="1" name=""/>
-        <p:cNvGrpSpPr/>
-        <p:nvPr/>
-      </p:nvGrpSpPr>
-      <p:grpSpPr>
-        <a:xfrm>
-          <a:off x="0" y="0"/>
-          <a:ext cx="0" cy="0"/>
-          <a:chOff x="0" y="0"/>
-          <a:chExt cx="0" cy="0"/>
-        </a:xfrm>
-      </p:grpSpPr>
-      <p:sp>
-        <p:nvSpPr>
-          <p:cNvPr id="2" name="Title 1"/>
-          <p:cNvSpPr>
-            <a:spLocks noGrp="1"/>
-          </p:cNvSpPr>
-          <p:nvPr>
-            <p:ph type="title"/>
-          </p:nvPr>
-        </p:nvSpPr>
-        <p:spPr/>
-        <p:txBody>
-          <a:bodyPr/>
-          <a:lstStyle/>
-          <a:p>
-            <a:pPr lvl="0" indent="0" marL="0">
-              <a:buNone/>
-            </a:pPr>
-            <a:r>
-              <a:rPr/>
-              <a:t>Generating Test Labels</a:t>
-            </a:r>
-          </a:p>
-        </p:txBody>
-      </p:sp>
-      <p:sp>
-        <p:nvSpPr>
-          <p:cNvPr id="3" name="Content Placeholder 2"/>
-          <p:cNvSpPr>
-            <a:spLocks noGrp="1"/>
-          </p:cNvSpPr>
-          <p:nvPr>
-            <p:ph idx="1"/>
-          </p:nvPr>
-        </p:nvSpPr>
-        <p:spPr/>
-        <p:txBody>
-          <a:bodyPr/>
-          <a:lstStyle/>
-          <a:p>
-            <a:pPr lvl="0"/>
-            <a:r>
-              <a:rPr/>
-              <a:t>Hand writing labels</a:t>
-            </a:r>
-          </a:p>
-          <a:p>
-            <a:pPr lvl="0"/>
-            <a:r>
-              <a:rPr/>
-              <a:t>Injecting discipline area fragments into label templates</a:t>
-            </a:r>
-          </a:p>
-          <a:p>
-            <a:pPr lvl="1"/>
-            <a:r>
-              <a:rPr/>
-              <a:t>In addition to making the labels easier to generate, the parts of the label that are being tested are separated from the rest of the label.</a:t>
-            </a:r>
-          </a:p>
-          <a:p>
-            <a:pPr lvl="0"/>
-            <a:r>
-              <a:rPr/>
-              <a:t>Mutating existing labels</a:t>
-            </a:r>
-          </a:p>
-          <a:p>
-            <a:pPr lvl="1"/>
-            <a:r>
-              <a:rPr/>
-              <a:t>Keep a mapping of </a:t>
-            </a:r>
-            <a:r>
-              <a:rPr i="1"/>
-              <a:t>XPath</a:t>
-            </a:r>
-            <a:r>
-              <a:rPr/>
-              <a:t>s and operations to perform on a location</a:t>
-            </a:r>
-          </a:p>
-        </p:txBody>
-      </p:sp>
-    </p:spTree>
-  </p:cSld>
-</p:sld>
-</file>
-
-<file path=ppt/slides/slide17.xml><?xml version="1.0" encoding="utf-8"?>
-<p:sld xmlns:a="http://schemas.openxmlformats.org/drawingml/2006/main" xmlns:r="http://schemas.openxmlformats.org/officeDocument/2006/relationships" xmlns:p="http://schemas.openxmlformats.org/presentationml/2006/main">
-  <p:cSld>
-    <p:spTree>
-      <p:nvGrpSpPr>
-        <p:cNvPr id="1" name=""/>
-        <p:cNvGrpSpPr/>
-        <p:nvPr/>
-      </p:nvGrpSpPr>
-      <p:grpSpPr>
-        <a:xfrm>
-          <a:off x="0" y="0"/>
-          <a:ext cx="0" cy="0"/>
-          <a:chOff x="0" y="0"/>
-          <a:chExt cx="0" cy="0"/>
-        </a:xfrm>
-      </p:grpSpPr>
-      <p:sp>
-        <p:nvSpPr>
-          <p:cNvPr id="2" name="Title 1"/>
-          <p:cNvSpPr>
-            <a:spLocks noGrp="1"/>
-          </p:cNvSpPr>
-          <p:nvPr>
-            <p:ph type="title"/>
-          </p:nvPr>
-        </p:nvSpPr>
-        <p:spPr>
-          <a:xfrm>
-            <a:off x="457201" y="204787"/>
-            <a:ext cx="3008313" cy="871538"/>
-          </a:xfrm>
-        </p:spPr>
-        <p:txBody>
-          <a:bodyPr/>
-          <a:lstStyle/>
-          <a:p>
-            <a:pPr lvl="0" indent="0" marL="0">
-              <a:buNone/>
-            </a:pPr>
-            <a:r>
-              <a:rPr/>
-              <a:t>Demonstration - LDD Test Generator</a:t>
-            </a:r>
-          </a:p>
-        </p:txBody>
-      </p:sp>
-      <p:sp>
-        <p:nvSpPr>
-          <p:cNvPr id="4" name="Text Placeholder 3"/>
-          <p:cNvSpPr>
-            <a:spLocks noGrp="1"/>
-          </p:cNvSpPr>
-          <p:nvPr>
-            <p:ph idx="2" sz="half" type="body"/>
-          </p:nvPr>
-        </p:nvSpPr>
-        <p:spPr/>
-        <p:txBody>
-          <a:bodyPr/>
-          <a:lstStyle/>
-          <a:p>
-            <a:pPr lvl="0" indent="0" marL="0">
-              <a:buNone/>
-            </a:pPr>
-            <a:r>
-              <a:rPr>
-                <a:hlinkClick r:id="rId2"/>
-              </a:rPr>
-              <a:t>https://github.com/sbn-psi/ldd_utilities/tree/master/LddTestGenerator</a:t>
-            </a:r>
-          </a:p>
-          <a:p>
-            <a:pPr lvl="0" indent="0" marL="0">
-              <a:spcBef>
-                <a:spcPts val="3000"/>
-              </a:spcBef>
-              <a:buNone/>
-            </a:pPr>
-            <a:r>
-              <a:rPr b="1"/>
-              <a:t>Objectives</a:t>
-            </a:r>
-          </a:p>
-          <a:p>
-            <a:pPr lvl="0"/>
-            <a:r>
-              <a:rPr/>
-              <a:t>Demonstrate a template-based approach to generating test labels</a:t>
-            </a:r>
-          </a:p>
-          <a:p>
-            <a:pPr lvl="0"/>
-            <a:r>
-              <a:rPr/>
-              <a:t>Mention how the framework could be expanded to mutate test files</a:t>
-            </a:r>
-          </a:p>
-        </p:txBody>
-      </p:sp>
-      <p:pic>
-        <p:nvPicPr>
-          <p:cNvPr descr="fig:  images/common/generator.png" id="0" name="Picture 1"/>
-          <p:cNvPicPr>
-            <a:picLocks noGrp="1" noChangeAspect="1"/>
-          </p:cNvPicPr>
-          <p:nvPr/>
-        </p:nvPicPr>
-        <p:blipFill>
-          <a:blip r:embed="rId3"/>
-          <a:stretch>
-            <a:fillRect/>
-          </a:stretch>
-        </p:blipFill>
-        <p:spPr bwMode="auto">
-          <a:xfrm>
-            <a:off x="4191000" y="203200"/>
-            <a:ext cx="3873500" cy="3873500"/>
-          </a:xfrm>
-          <a:prstGeom prst="rect">
-            <a:avLst/>
-          </a:prstGeom>
-          <a:noFill/>
-          <a:ln w="9525">
-            <a:noFill/>
-            <a:headEnd/>
-            <a:tailEnd/>
-          </a:ln>
-        </p:spPr>
-      </p:pic>
-      <p:sp>
-        <p:nvSpPr>
-          <p:cNvPr id="1" name="TextBox 3"/>
-          <p:cNvSpPr txBox="1"/>
-          <p:nvPr/>
-        </p:nvSpPr>
-        <p:spPr>
-          <a:xfrm>
-            <a:off x="3568700" y="4076700"/>
-            <a:ext cx="5105400" cy="508000"/>
-          </a:xfrm>
-          <a:prstGeom prst="rect">
-            <a:avLst/>
-          </a:prstGeom>
-          <a:noFill/>
-        </p:spPr>
-        <p:txBody>
-          <a:bodyPr/>
-          <a:lstStyle/>
-          <a:p>
-            <a:pPr lvl="0" indent="0" marL="0" algn="ctr">
-              <a:buNone/>
-            </a:pPr>
-            <a:r>
-              <a:rPr/>
-              <a:t>generator</a:t>
-            </a:r>
-          </a:p>
-        </p:txBody>
-      </p:sp>
-    </p:spTree>
-  </p:cSld>
-</p:sld>
-</file>
-
-<file path=ppt/slides/slide18.xml><?xml version="1.0" encoding="utf-8"?>
-<p:sld xmlns:a="http://schemas.openxmlformats.org/drawingml/2006/main" xmlns:r="http://schemas.openxmlformats.org/officeDocument/2006/relationships" xmlns:p="http://schemas.openxmlformats.org/presentationml/2006/main">
-  <p:cSld>
-    <p:spTree>
-      <p:nvGrpSpPr>
-        <p:cNvPr id="1" name=""/>
-        <p:cNvGrpSpPr/>
-        <p:nvPr/>
-      </p:nvGrpSpPr>
-      <p:grpSpPr>
-        <a:xfrm>
-          <a:off x="0" y="0"/>
-          <a:ext cx="0" cy="0"/>
-          <a:chOff x="0" y="0"/>
-          <a:chExt cx="0" cy="0"/>
-        </a:xfrm>
-      </p:grpSpPr>
-      <p:sp>
-        <p:nvSpPr>
-          <p:cNvPr id="2" name="Title 1"/>
-          <p:cNvSpPr>
-            <a:spLocks noGrp="1"/>
-          </p:cNvSpPr>
-          <p:nvPr>
-            <p:ph type="title"/>
-          </p:nvPr>
-        </p:nvSpPr>
-        <p:spPr/>
-        <p:txBody>
-          <a:bodyPr/>
-          <a:lstStyle/>
-          <a:p>
-            <a:pPr lvl="0" indent="0" marL="0">
-              <a:buNone/>
-            </a:pPr>
-            <a:r>
-              <a:rPr/>
-              <a:t>Monolithic tests</a:t>
-            </a:r>
-          </a:p>
-        </p:txBody>
-      </p:sp>
-      <p:sp>
-        <p:nvSpPr>
-          <p:cNvPr id="3" name="Content Placeholder 2"/>
-          <p:cNvSpPr>
-            <a:spLocks noGrp="1"/>
-          </p:cNvSpPr>
-          <p:nvPr>
-            <p:ph idx="1"/>
-          </p:nvPr>
-        </p:nvSpPr>
-        <p:spPr/>
-        <p:txBody>
-          <a:bodyPr/>
-          <a:lstStyle/>
-          <a:p>
-            <a:pPr lvl="0"/>
-            <a:r>
-              <a:rPr/>
-              <a:t>Multiple tests can be packed into a single label</a:t>
-            </a:r>
-          </a:p>
-          <a:p>
-            <a:pPr lvl="0"/>
-            <a:r>
-              <a:rPr/>
-              <a:t>Document each point where the test is expected to fail</a:t>
-            </a:r>
-          </a:p>
-          <a:p>
-            <a:pPr lvl="0"/>
-            <a:r>
-              <a:rPr/>
-              <a:t>Examine the output of the test run to determine if there are any missed failures</a:t>
-            </a:r>
-          </a:p>
-        </p:txBody>
-      </p:sp>
-    </p:spTree>
-  </p:cSld>
-</p:sld>
-</file>
-
-<file path=ppt/slides/slide19.xml><?xml version="1.0" encoding="utf-8"?>
-<p:sld xmlns:a="http://schemas.openxmlformats.org/drawingml/2006/main" xmlns:r="http://schemas.openxmlformats.org/officeDocument/2006/relationships" xmlns:p="http://schemas.openxmlformats.org/presentationml/2006/main">
-  <p:cSld>
-    <p:spTree>
-      <p:nvGrpSpPr>
-        <p:cNvPr id="1" name=""/>
-        <p:cNvGrpSpPr/>
-        <p:nvPr/>
-      </p:nvGrpSpPr>
-      <p:grpSpPr>
-        <a:xfrm>
-          <a:off x="0" y="0"/>
-          <a:ext cx="0" cy="0"/>
-          <a:chOff x="0" y="0"/>
-          <a:chExt cx="0" cy="0"/>
-        </a:xfrm>
-      </p:grpSpPr>
-      <p:sp>
-        <p:nvSpPr>
-          <p:cNvPr id="2" name="Title 1"/>
-          <p:cNvSpPr>
-            <a:spLocks noGrp="1"/>
-          </p:cNvSpPr>
-          <p:nvPr>
-            <p:ph type="title"/>
-          </p:nvPr>
-        </p:nvSpPr>
-        <p:spPr>
-          <a:xfrm>
-            <a:off x="457201" y="204787"/>
-            <a:ext cx="3008313" cy="871538"/>
-          </a:xfrm>
-        </p:spPr>
-        <p:txBody>
-          <a:bodyPr/>
-          <a:lstStyle/>
-          <a:p>
-            <a:pPr lvl="0" indent="0" marL="0">
-              <a:buNone/>
-            </a:pPr>
-            <a:r>
-              <a:rPr/>
-              <a:t>Demonstration - Spectral Dictionary Tests</a:t>
-            </a:r>
-          </a:p>
-        </p:txBody>
-      </p:sp>
-      <p:sp>
-        <p:nvSpPr>
-          <p:cNvPr id="4" name="Text Placeholder 3"/>
-          <p:cNvSpPr>
-            <a:spLocks noGrp="1"/>
-          </p:cNvSpPr>
-          <p:nvPr>
-            <p:ph idx="2" sz="half" type="body"/>
-          </p:nvPr>
-        </p:nvSpPr>
-        <p:spPr/>
-        <p:txBody>
-          <a:bodyPr/>
-          <a:lstStyle/>
-          <a:p>
-            <a:pPr lvl="0" indent="0" marL="0">
-              <a:buNone/>
-            </a:pPr>
-            <a:r>
-              <a:rPr>
-                <a:hlinkClick r:id="rId2"/>
-              </a:rPr>
-              <a:t>https://github.com/pds-data-dictionaries/ldd-spectral/tree/main/test</a:t>
-            </a:r>
-          </a:p>
-          <a:p>
-            <a:pPr lvl="0" indent="0" marL="0">
-              <a:spcBef>
-                <a:spcPts val="3000"/>
-              </a:spcBef>
-              <a:buNone/>
-            </a:pPr>
-            <a:r>
-              <a:rPr b="1"/>
-              <a:t>Objectives</a:t>
-            </a:r>
-          </a:p>
-          <a:p>
-            <a:pPr lvl="0"/>
-            <a:r>
-              <a:rPr/>
-              <a:t>Demonstrate monolithic tests</a:t>
-            </a:r>
-          </a:p>
-        </p:txBody>
-      </p:sp>
-      <p:pic>
-        <p:nvPicPr>
-          <p:cNvPr descr="fig:  images/common/ldd-spectral.png" id="0" name="Picture 1"/>
-          <p:cNvPicPr>
-            <a:picLocks noGrp="1" noChangeAspect="1"/>
-          </p:cNvPicPr>
-          <p:nvPr/>
-        </p:nvPicPr>
-        <p:blipFill>
-          <a:blip r:embed="rId3"/>
-          <a:stretch>
-            <a:fillRect/>
-          </a:stretch>
-        </p:blipFill>
-        <p:spPr bwMode="auto">
-          <a:xfrm>
-            <a:off x="4191000" y="203200"/>
-            <a:ext cx="3873500" cy="3873500"/>
-          </a:xfrm>
-          <a:prstGeom prst="rect">
-            <a:avLst/>
-          </a:prstGeom>
-          <a:noFill/>
-          <a:ln w="9525">
-            <a:noFill/>
-            <a:headEnd/>
-            <a:tailEnd/>
-          </a:ln>
-        </p:spPr>
-      </p:pic>
-      <p:sp>
-        <p:nvSpPr>
-          <p:cNvPr id="1" name="TextBox 3"/>
-          <p:cNvSpPr txBox="1"/>
-          <p:nvPr/>
-        </p:nvSpPr>
-        <p:spPr>
-          <a:xfrm>
-            <a:off x="3568700" y="4076700"/>
-            <a:ext cx="5105400" cy="508000"/>
-          </a:xfrm>
-          <a:prstGeom prst="rect">
-            <a:avLst/>
-          </a:prstGeom>
-          <a:noFill/>
-        </p:spPr>
-        <p:txBody>
-          <a:bodyPr/>
-          <a:lstStyle/>
-          <a:p>
-            <a:pPr lvl="0" indent="0" marL="0" algn="ctr">
-              <a:buNone/>
-            </a:pPr>
-            <a:r>
-              <a:rPr/>
-              <a:t>ldd-spectral</a:t>
-            </a:r>
-          </a:p>
-        </p:txBody>
-      </p:sp>
-    </p:spTree>
-  </p:cSld>
-</p:sld>
-</file>
-
-<file path=ppt/slides/slide2.xml><?xml version="1.0" encoding="utf-8"?>
-<p:sld xmlns:a="http://schemas.openxmlformats.org/drawingml/2006/main" xmlns:r="http://schemas.openxmlformats.org/officeDocument/2006/relationships" xmlns:p="http://schemas.openxmlformats.org/presentationml/2006/main">
-  <p:cSld>
-    <p:spTree>
-      <p:nvGrpSpPr>
-        <p:cNvPr id="1" name=""/>
-        <p:cNvGrpSpPr/>
-        <p:nvPr/>
-      </p:nvGrpSpPr>
-      <p:grpSpPr>
-        <a:xfrm>
-          <a:off x="0" y="0"/>
-          <a:ext cx="0" cy="0"/>
-          <a:chOff x="0" y="0"/>
-          <a:chExt cx="0" cy="0"/>
-        </a:xfrm>
-      </p:grpSpPr>
-      <p:sp>
-        <p:nvSpPr>
-          <p:cNvPr id="2" name="Title 1"/>
-          <p:cNvSpPr>
-            <a:spLocks noGrp="1"/>
-          </p:cNvSpPr>
-          <p:nvPr>
-            <p:ph type="title"/>
-          </p:nvPr>
-        </p:nvSpPr>
-        <p:spPr/>
-        <p:txBody>
-          <a:bodyPr/>
-          <a:lstStyle/>
-          <a:p>
-            <a:pPr lvl="0" indent="0" marL="0">
-              <a:buNone/>
-            </a:pPr>
-            <a:r>
-              <a:rPr/>
-              <a:t>Why Tests?</a:t>
-            </a:r>
-          </a:p>
-        </p:txBody>
-      </p:sp>
-      <p:sp>
-        <p:nvSpPr>
-          <p:cNvPr id="3" name="Content Placeholder 2"/>
-          <p:cNvSpPr>
-            <a:spLocks noGrp="1"/>
-          </p:cNvSpPr>
-          <p:nvPr>
-            <p:ph idx="1"/>
-          </p:nvPr>
-        </p:nvSpPr>
-        <p:spPr/>
-        <p:txBody>
-          <a:bodyPr/>
-          <a:lstStyle/>
-          <a:p>
-            <a:pPr lvl="0"/>
-            <a:r>
-              <a:rPr/>
-              <a:t>Passing tests provide examples of how the dictionary is used</a:t>
-            </a:r>
-          </a:p>
-          <a:p>
-            <a:pPr lvl="1"/>
-            <a:r>
-              <a:rPr/>
-              <a:t>This is not a substitute for documentation, but can supplement it</a:t>
-            </a:r>
-          </a:p>
-          <a:p>
-            <a:pPr lvl="0"/>
-            <a:r>
-              <a:rPr/>
-              <a:t>Ensure that every class definition works as intended</a:t>
-            </a:r>
-          </a:p>
-          <a:p>
-            <a:pPr lvl="0"/>
-            <a:r>
-              <a:rPr/>
-              <a:t>Ensures that schematron tests are running</a:t>
-            </a:r>
-          </a:p>
-          <a:p>
-            <a:pPr lvl="1"/>
-            <a:r>
-              <a:rPr/>
-              <a:t>Ensures that your schematron rules are correct</a:t>
-            </a:r>
-          </a:p>
-          <a:p>
-            <a:pPr lvl="0"/>
-            <a:r>
-              <a:rPr/>
-              <a:t>Prevent regressions</a:t>
-            </a:r>
-          </a:p>
-          <a:p>
-            <a:pPr lvl="1"/>
-            <a:r>
-              <a:rPr/>
-              <a:t>Regressions are unintended side-effects created by making changes</a:t>
-            </a:r>
-          </a:p>
-          <a:p>
-            <a:pPr lvl="0"/>
-            <a:r>
-              <a:rPr/>
-              <a:t>Warns if changes are not backwards-compatible</a:t>
-            </a:r>
-          </a:p>
-        </p:txBody>
-      </p:sp>
-    </p:spTree>
-  </p:cSld>
-</p:sld>
-</file>
-
-<file path=ppt/slides/slide20.xml><?xml version="1.0" encoding="utf-8"?>
-<p:sld xmlns:a="http://schemas.openxmlformats.org/drawingml/2006/main" xmlns:r="http://schemas.openxmlformats.org/officeDocument/2006/relationships" xmlns:p="http://schemas.openxmlformats.org/presentationml/2006/main">
-  <p:cSld>
-    <p:spTree>
-      <p:nvGrpSpPr>
-        <p:cNvPr id="1" name=""/>
-        <p:cNvGrpSpPr/>
-        <p:nvPr/>
-      </p:nvGrpSpPr>
-      <p:grpSpPr>
-        <a:xfrm>
-          <a:off x="0" y="0"/>
-          <a:ext cx="0" cy="0"/>
-          <a:chOff x="0" y="0"/>
-          <a:chExt cx="0" cy="0"/>
-        </a:xfrm>
-      </p:grpSpPr>
-      <p:sp>
-        <p:nvSpPr>
-          <p:cNvPr id="2" name="Title 1"/>
-          <p:cNvSpPr>
-            <a:spLocks noGrp="1"/>
-          </p:cNvSpPr>
-          <p:nvPr>
-            <p:ph type="title"/>
-          </p:nvPr>
-        </p:nvSpPr>
-        <p:spPr/>
-        <p:txBody>
-          <a:bodyPr/>
-          <a:lstStyle/>
-          <a:p>
-            <a:pPr lvl="0" indent="0" marL="0">
-              <a:buNone/>
-            </a:pPr>
-            <a:r>
-              <a:rPr/>
-              <a:t>Interpreting the test output for monolithic tests</a:t>
-            </a:r>
-          </a:p>
-        </p:txBody>
-      </p:sp>
-      <p:sp>
-        <p:nvSpPr>
-          <p:cNvPr id="3" name="Content Placeholder 2"/>
-          <p:cNvSpPr>
-            <a:spLocks noGrp="1"/>
-          </p:cNvSpPr>
-          <p:nvPr>
-            <p:ph idx="1"/>
-          </p:nvPr>
-        </p:nvSpPr>
-        <p:spPr/>
-        <p:txBody>
-          <a:bodyPr/>
-          <a:lstStyle/>
-          <a:p>
-            <a:pPr lvl="0"/>
-            <a:r>
-              <a:rPr/>
-              <a:t>Since monolithic tests have only a pass/fail result, and there are multiple expected failures, it’s possible to miss failures</a:t>
-            </a:r>
-          </a:p>
-          <a:p>
-            <a:pPr lvl="0"/>
-            <a:r>
-              <a:rPr/>
-              <a:t>This can be mitigated by expecting a certain number of failures, or checking for specific failure messages</a:t>
-            </a:r>
-          </a:p>
-          <a:p>
-            <a:pPr lvl="1"/>
-            <a:r>
-              <a:rPr/>
-              <a:t>This would require updates to the test runner</a:t>
-            </a:r>
-          </a:p>
-        </p:txBody>
-      </p:sp>
-    </p:spTree>
-  </p:cSld>
-</p:sld>
-</file>
-
-<file path=ppt/slides/slide21.xml><?xml version="1.0" encoding="utf-8"?>
-<p:sld xmlns:a="http://schemas.openxmlformats.org/drawingml/2006/main" xmlns:r="http://schemas.openxmlformats.org/officeDocument/2006/relationships" xmlns:p="http://schemas.openxmlformats.org/presentationml/2006/main">
-  <p:cSld>
-    <p:spTree>
-      <p:nvGrpSpPr>
-        <p:cNvPr id="1" name=""/>
-        <p:cNvGrpSpPr/>
-        <p:nvPr/>
-      </p:nvGrpSpPr>
-      <p:grpSpPr>
-        <a:xfrm>
-          <a:off x="0" y="0"/>
-          <a:ext cx="0" cy="0"/>
-          <a:chOff x="0" y="0"/>
-          <a:chExt cx="0" cy="0"/>
-        </a:xfrm>
-      </p:grpSpPr>
-      <p:sp>
-        <p:nvSpPr>
-          <p:cNvPr id="2" name="Title 1"/>
-          <p:cNvSpPr>
-            <a:spLocks noGrp="1"/>
-          </p:cNvSpPr>
-          <p:nvPr>
-            <p:ph type="title"/>
-          </p:nvPr>
-        </p:nvSpPr>
-        <p:spPr/>
-        <p:txBody>
-          <a:bodyPr/>
-          <a:lstStyle/>
-          <a:p>
-            <a:pPr lvl="0" indent="0" marL="0">
-              <a:buNone/>
-            </a:pPr>
-            <a:r>
-              <a:rPr/>
-              <a:t>How many tests?</a:t>
-            </a:r>
-          </a:p>
-        </p:txBody>
-      </p:sp>
-      <p:sp>
-        <p:nvSpPr>
-          <p:cNvPr id="3" name="Content Placeholder 2"/>
-          <p:cNvSpPr>
-            <a:spLocks noGrp="1"/>
-          </p:cNvSpPr>
-          <p:nvPr>
-            <p:ph idx="1"/>
-          </p:nvPr>
-        </p:nvSpPr>
-        <p:spPr/>
-        <p:txBody>
-          <a:bodyPr/>
-          <a:lstStyle/>
-          <a:p>
-            <a:pPr lvl="0"/>
-            <a:r>
-              <a:rPr/>
-              <a:t>You want to have enough to thoroughly test your dictionary.</a:t>
-            </a:r>
-          </a:p>
-          <a:p>
-            <a:pPr lvl="1"/>
-            <a:r>
-              <a:rPr/>
-              <a:t>Typically, this means that every class should be used at least once</a:t>
-            </a:r>
-          </a:p>
-          <a:p>
-            <a:pPr lvl="1"/>
-            <a:r>
-              <a:rPr/>
-              <a:t>Every schematron rule should pass and fail at least once, as well.</a:t>
-            </a:r>
-          </a:p>
-          <a:p>
-            <a:pPr lvl="0"/>
-            <a:r>
-              <a:rPr/>
-              <a:t>Too many tests can cause problems (This does </a:t>
-            </a:r>
-            <a:r>
-              <a:rPr i="1"/>
-              <a:t>not</a:t>
-            </a:r>
-            <a:r>
-              <a:rPr/>
-              <a:t> mean don’t write tests)</a:t>
-            </a:r>
-          </a:p>
-          <a:p>
-            <a:pPr lvl="1"/>
-            <a:r>
-              <a:rPr/>
-              <a:t>The biggest problem with too many tests is that they need to be maintained</a:t>
-            </a:r>
-          </a:p>
-          <a:p>
-            <a:pPr lvl="1"/>
-            <a:r>
-              <a:rPr/>
-              <a:t>Maintenance can be necessary when either your dictionary changes, or when the dependencies change (IM changes, upstream dictionaries, etc)</a:t>
-            </a:r>
-          </a:p>
-          <a:p>
-            <a:pPr lvl="1"/>
-            <a:r>
-              <a:rPr/>
-              <a:t>A test should have its own job – it shouldn’t just functionally duplicate another test</a:t>
-            </a:r>
-          </a:p>
-        </p:txBody>
-      </p:sp>
-    </p:spTree>
-  </p:cSld>
-</p:sld>
-</file>
-
-<file path=ppt/slides/slide22.xml><?xml version="1.0" encoding="utf-8"?>
-<p:sld xmlns:a="http://schemas.openxmlformats.org/drawingml/2006/main" xmlns:r="http://schemas.openxmlformats.org/officeDocument/2006/relationships" xmlns:p="http://schemas.openxmlformats.org/presentationml/2006/main">
-  <p:cSld>
-    <p:spTree>
-      <p:nvGrpSpPr>
-        <p:cNvPr id="1" name=""/>
-        <p:cNvGrpSpPr/>
-        <p:nvPr/>
-      </p:nvGrpSpPr>
-      <p:grpSpPr>
-        <a:xfrm>
-          <a:off x="0" y="0"/>
-          <a:ext cx="0" cy="0"/>
-          <a:chOff x="0" y="0"/>
-          <a:chExt cx="0" cy="0"/>
-        </a:xfrm>
-      </p:grpSpPr>
-      <p:sp>
-        <p:nvSpPr>
-          <p:cNvPr id="2" name="Title 1"/>
-          <p:cNvSpPr>
-            <a:spLocks noGrp="1"/>
-          </p:cNvSpPr>
-          <p:nvPr>
-            <p:ph type="title"/>
-          </p:nvPr>
-        </p:nvSpPr>
-        <p:spPr/>
-        <p:txBody>
-          <a:bodyPr/>
-          <a:lstStyle/>
-          <a:p>
-            <a:pPr lvl="0" indent="0" marL="0">
-              <a:buNone/>
-            </a:pPr>
-            <a:r>
-              <a:rPr/>
-              <a:t>Exercise every class</a:t>
-            </a:r>
-          </a:p>
-        </p:txBody>
-      </p:sp>
-      <p:sp>
-        <p:nvSpPr>
-          <p:cNvPr id="3" name="Content Placeholder 2"/>
-          <p:cNvSpPr>
-            <a:spLocks noGrp="1"/>
-          </p:cNvSpPr>
-          <p:nvPr>
-            <p:ph idx="1"/>
-          </p:nvPr>
-        </p:nvSpPr>
-        <p:spPr/>
-        <p:txBody>
-          <a:bodyPr/>
-          <a:lstStyle/>
-          <a:p>
-            <a:pPr lvl="0"/>
-            <a:r>
-              <a:rPr/>
-              <a:t>At least one passing test should use each class</a:t>
-            </a:r>
-          </a:p>
-          <a:p>
-            <a:pPr lvl="0"/>
-            <a:r>
-              <a:rPr/>
-              <a:t>Write as many test files as necessary to achieve this.</a:t>
-            </a:r>
-          </a:p>
-        </p:txBody>
-      </p:sp>
-    </p:spTree>
-  </p:cSld>
-</p:sld>
-</file>
-
-<file path=ppt/slides/slide23.xml><?xml version="1.0" encoding="utf-8"?>
-<p:sld xmlns:a="http://schemas.openxmlformats.org/drawingml/2006/main" xmlns:r="http://schemas.openxmlformats.org/officeDocument/2006/relationships" xmlns:p="http://schemas.openxmlformats.org/presentationml/2006/main">
-  <p:cSld>
-    <p:spTree>
-      <p:nvGrpSpPr>
-        <p:cNvPr id="1" name=""/>
-        <p:cNvGrpSpPr/>
-        <p:nvPr/>
-      </p:nvGrpSpPr>
-      <p:grpSpPr>
-        <a:xfrm>
-          <a:off x="0" y="0"/>
-          <a:ext cx="0" cy="0"/>
-          <a:chOff x="0" y="0"/>
-          <a:chExt cx="0" cy="0"/>
-        </a:xfrm>
-      </p:grpSpPr>
-      <p:sp>
-        <p:nvSpPr>
-          <p:cNvPr id="2" name="Title 1"/>
-          <p:cNvSpPr>
-            <a:spLocks noGrp="1"/>
-          </p:cNvSpPr>
-          <p:nvPr>
-            <p:ph type="title"/>
-          </p:nvPr>
-        </p:nvSpPr>
-        <p:spPr/>
-        <p:txBody>
-          <a:bodyPr/>
-          <a:lstStyle/>
-          <a:p>
-            <a:pPr lvl="0" indent="0" marL="0">
-              <a:buNone/>
-            </a:pPr>
-            <a:r>
-              <a:rPr/>
-              <a:t>Exercise every schematron rule</a:t>
-            </a:r>
-          </a:p>
-        </p:txBody>
-      </p:sp>
-      <p:sp>
-        <p:nvSpPr>
-          <p:cNvPr id="3" name="Content Placeholder 2"/>
-          <p:cNvSpPr>
-            <a:spLocks noGrp="1"/>
-          </p:cNvSpPr>
-          <p:nvPr>
-            <p:ph idx="1"/>
-          </p:nvPr>
-        </p:nvSpPr>
-        <p:spPr/>
-        <p:txBody>
-          <a:bodyPr/>
-          <a:lstStyle/>
-          <a:p>
-            <a:pPr lvl="0"/>
-            <a:r>
-              <a:rPr/>
-              <a:t>At least one invalid label test should fail each schematron rule.</a:t>
-            </a:r>
-          </a:p>
-          <a:p>
-            <a:pPr lvl="0"/>
-            <a:r>
-              <a:rPr/>
-              <a:t>At least one valid label test should pass each schematron rule</a:t>
-            </a:r>
-          </a:p>
-          <a:p>
-            <a:pPr lvl="0"/>
-            <a:r>
-              <a:rPr/>
-              <a:t>At least one valid label test should not trigger the schematron rule, if possible.</a:t>
-            </a:r>
-          </a:p>
-          <a:p>
-            <a:pPr lvl="0"/>
-            <a:r>
-              <a:rPr/>
-              <a:t>This is especially important, since schematron rules can be prevented from triggering if incorrectly written.</a:t>
-            </a:r>
-          </a:p>
-        </p:txBody>
-      </p:sp>
-    </p:spTree>
-  </p:cSld>
-</p:sld>
-</file>
-
-<file path=ppt/slides/slide24.xml><?xml version="1.0" encoding="utf-8"?>
-<p:sld xmlns:a="http://schemas.openxmlformats.org/drawingml/2006/main" xmlns:r="http://schemas.openxmlformats.org/officeDocument/2006/relationships" xmlns:p="http://schemas.openxmlformats.org/presentationml/2006/main">
-  <p:cSld>
-    <p:spTree>
-      <p:nvGrpSpPr>
-        <p:cNvPr id="1" name=""/>
-        <p:cNvGrpSpPr/>
-        <p:nvPr/>
-      </p:nvGrpSpPr>
-      <p:grpSpPr>
-        <a:xfrm>
-          <a:off x="0" y="0"/>
-          <a:ext cx="0" cy="0"/>
-          <a:chOff x="0" y="0"/>
-          <a:chExt cx="0" cy="0"/>
-        </a:xfrm>
-      </p:grpSpPr>
-      <p:sp>
-        <p:nvSpPr>
-          <p:cNvPr id="2" name="Title 1"/>
-          <p:cNvSpPr>
-            <a:spLocks noGrp="1"/>
-          </p:cNvSpPr>
-          <p:nvPr>
-            <p:ph type="title"/>
-          </p:nvPr>
-        </p:nvSpPr>
-        <p:spPr>
-          <a:xfrm>
-            <a:off x="457201" y="204787"/>
-            <a:ext cx="3008313" cy="871538"/>
-          </a:xfrm>
-        </p:spPr>
-        <p:txBody>
-          <a:bodyPr/>
-          <a:lstStyle/>
-          <a:p>
-            <a:pPr lvl="0" indent="0" marL="0">
-              <a:buNone/>
-            </a:pPr>
-            <a:r>
-              <a:rPr/>
-              <a:t>Demonstration - Nucspec Dictionary Tests</a:t>
-            </a:r>
-          </a:p>
-        </p:txBody>
-      </p:sp>
-      <p:sp>
-        <p:nvSpPr>
-          <p:cNvPr id="4" name="Text Placeholder 3"/>
-          <p:cNvSpPr>
-            <a:spLocks noGrp="1"/>
-          </p:cNvSpPr>
-          <p:nvPr>
-            <p:ph idx="2" sz="half" type="body"/>
-          </p:nvPr>
-        </p:nvSpPr>
-        <p:spPr/>
-        <p:txBody>
-          <a:bodyPr/>
-          <a:lstStyle/>
-          <a:p>
-            <a:pPr lvl="0" indent="0" marL="0">
-              <a:buNone/>
-            </a:pPr>
-            <a:r>
-              <a:rPr>
-                <a:hlinkClick r:id="rId2"/>
-              </a:rPr>
-              <a:t>https://github.com/pds-data-dictionaries/ldd-nucspec/tree/main/test</a:t>
-            </a:r>
-          </a:p>
-          <a:p>
-            <a:pPr lvl="0" indent="0" marL="0">
-              <a:spcBef>
-                <a:spcPts val="3000"/>
-              </a:spcBef>
-              <a:buNone/>
-            </a:pPr>
-            <a:r>
-              <a:rPr b="1"/>
-              <a:t>Objectives</a:t>
-            </a:r>
-          </a:p>
-          <a:p>
-            <a:pPr lvl="0"/>
-            <a:r>
-              <a:rPr/>
-              <a:t>Demonstrate tests for each schematron rule</a:t>
-            </a:r>
-          </a:p>
-        </p:txBody>
-      </p:sp>
-      <p:pic>
-        <p:nvPicPr>
-          <p:cNvPr descr="fig:  images/common/ldd-nucspec.png" id="0" name="Picture 1"/>
-          <p:cNvPicPr>
-            <a:picLocks noGrp="1" noChangeAspect="1"/>
-          </p:cNvPicPr>
-          <p:nvPr/>
-        </p:nvPicPr>
-        <p:blipFill>
-          <a:blip r:embed="rId3"/>
-          <a:stretch>
-            <a:fillRect/>
-          </a:stretch>
-        </p:blipFill>
-        <p:spPr bwMode="auto">
-          <a:xfrm>
-            <a:off x="4191000" y="203200"/>
-            <a:ext cx="3873500" cy="3873500"/>
-          </a:xfrm>
-          <a:prstGeom prst="rect">
-            <a:avLst/>
-          </a:prstGeom>
-          <a:noFill/>
-          <a:ln w="9525">
-            <a:noFill/>
-            <a:headEnd/>
-            <a:tailEnd/>
-          </a:ln>
-        </p:spPr>
-      </p:pic>
-      <p:sp>
-        <p:nvSpPr>
-          <p:cNvPr id="1" name="TextBox 3"/>
-          <p:cNvSpPr txBox="1"/>
-          <p:nvPr/>
-        </p:nvSpPr>
-        <p:spPr>
-          <a:xfrm>
-            <a:off x="3568700" y="4076700"/>
-            <a:ext cx="5105400" cy="508000"/>
-          </a:xfrm>
-          <a:prstGeom prst="rect">
-            <a:avLst/>
-          </a:prstGeom>
-          <a:noFill/>
-        </p:spPr>
-        <p:txBody>
-          <a:bodyPr/>
-          <a:lstStyle/>
-          <a:p>
-            <a:pPr lvl="0" indent="0" marL="0" algn="ctr">
-              <a:buNone/>
-            </a:pPr>
-            <a:r>
-              <a:rPr/>
-              <a:t>ldd-nucspec</a:t>
-            </a:r>
-          </a:p>
-        </p:txBody>
-      </p:sp>
-    </p:spTree>
-  </p:cSld>
-</p:sld>
-</file>
-
-<file path=ppt/slides/slide25.xml><?xml version="1.0" encoding="utf-8"?>
-<p:sld xmlns:a="http://schemas.openxmlformats.org/drawingml/2006/main" xmlns:r="http://schemas.openxmlformats.org/officeDocument/2006/relationships" xmlns:p="http://schemas.openxmlformats.org/presentationml/2006/main">
-  <p:cSld>
-    <p:spTree>
-      <p:nvGrpSpPr>
-        <p:cNvPr id="1" name=""/>
-        <p:cNvGrpSpPr/>
-        <p:nvPr/>
-      </p:nvGrpSpPr>
-      <p:grpSpPr>
-        <a:xfrm>
-          <a:off x="0" y="0"/>
-          <a:ext cx="0" cy="0"/>
-          <a:chOff x="0" y="0"/>
-          <a:chExt cx="0" cy="0"/>
-        </a:xfrm>
-      </p:grpSpPr>
-      <p:sp>
-        <p:nvSpPr>
-          <p:cNvPr id="2" name="Title 1"/>
-          <p:cNvSpPr>
-            <a:spLocks noGrp="1"/>
-          </p:cNvSpPr>
-          <p:nvPr>
-            <p:ph type="title"/>
-          </p:nvPr>
-        </p:nvSpPr>
-        <p:spPr/>
-        <p:txBody>
-          <a:bodyPr/>
-          <a:lstStyle/>
-          <a:p>
-            <a:pPr lvl="0" indent="0" marL="0">
-              <a:buNone/>
-            </a:pPr>
-            <a:r>
-              <a:rPr/>
-              <a:t>Document the tests</a:t>
-            </a:r>
-          </a:p>
-        </p:txBody>
-      </p:sp>
-      <p:sp>
-        <p:nvSpPr>
-          <p:cNvPr id="3" name="Content Placeholder 2"/>
-          <p:cNvSpPr>
-            <a:spLocks noGrp="1"/>
-          </p:cNvSpPr>
-          <p:nvPr>
-            <p:ph idx="1"/>
-          </p:nvPr>
-        </p:nvSpPr>
-        <p:spPr/>
-        <p:txBody>
-          <a:bodyPr/>
-          <a:lstStyle/>
-          <a:p>
-            <a:pPr lvl="0"/>
-            <a:r>
-              <a:rPr/>
-              <a:t>Documentation can be as simple as a file that lists the test name and what it is testing.</a:t>
-            </a:r>
-          </a:p>
-          <a:p>
-            <a:pPr lvl="0"/>
-            <a:r>
-              <a:rPr/>
-              <a:t>This will remind you how each test is expected to fail, or what each test is intended to exercise.</a:t>
-            </a:r>
-          </a:p>
-          <a:p>
-            <a:pPr lvl="0"/>
-            <a:r>
-              <a:rPr/>
-              <a:t>If writing a monolithic test, this can be further developed into the expected output for comparison in a future version of the EN testing tool.</a:t>
-            </a:r>
-          </a:p>
-          <a:p>
-            <a:pPr lvl="0"/>
-            <a:r>
-              <a:rPr/>
-              <a:t>Documentation can also be written inline. It would be valuable to note precisely which line should fail.</a:t>
-            </a:r>
-          </a:p>
-        </p:txBody>
-      </p:sp>
-    </p:spTree>
-  </p:cSld>
-</p:sld>
-</file>
-
-<file path=ppt/slides/slide26.xml><?xml version="1.0" encoding="utf-8"?>
-<p:sld xmlns:a="http://schemas.openxmlformats.org/drawingml/2006/main" xmlns:r="http://schemas.openxmlformats.org/officeDocument/2006/relationships" xmlns:p="http://schemas.openxmlformats.org/presentationml/2006/main">
-  <p:cSld>
-    <p:spTree>
-      <p:nvGrpSpPr>
-        <p:cNvPr id="1" name=""/>
-        <p:cNvGrpSpPr/>
-        <p:nvPr/>
-      </p:nvGrpSpPr>
-      <p:grpSpPr>
-        <a:xfrm>
-          <a:off x="0" y="0"/>
-          <a:ext cx="0" cy="0"/>
-          <a:chOff x="0" y="0"/>
-          <a:chExt cx="0" cy="0"/>
-        </a:xfrm>
-      </p:grpSpPr>
-      <p:sp>
-        <p:nvSpPr>
-          <p:cNvPr id="2" name="Title 1"/>
-          <p:cNvSpPr>
-            <a:spLocks noGrp="1"/>
-          </p:cNvSpPr>
-          <p:nvPr>
-            <p:ph type="title"/>
-          </p:nvPr>
-        </p:nvSpPr>
-        <p:spPr/>
-        <p:txBody>
-          <a:bodyPr/>
-          <a:lstStyle/>
-          <a:p>
-            <a:pPr lvl="0" indent="0" marL="0">
-              <a:buNone/>
-            </a:pPr>
-            <a:r>
-              <a:rPr/>
-              <a:t>Organize the tests</a:t>
-            </a:r>
-          </a:p>
-        </p:txBody>
-      </p:sp>
-      <p:sp>
-        <p:nvSpPr>
-          <p:cNvPr id="3" name="Content Placeholder 2"/>
-          <p:cNvSpPr>
-            <a:spLocks noGrp="1"/>
-          </p:cNvSpPr>
-          <p:nvPr>
-            <p:ph idx="1"/>
-          </p:nvPr>
-        </p:nvSpPr>
-        <p:spPr/>
-        <p:txBody>
-          <a:bodyPr/>
-          <a:lstStyle/>
-          <a:p>
-            <a:pPr lvl="0" indent="0" marL="0">
-              <a:buNone/>
-            </a:pPr>
-            <a:r>
-              <a:rPr/>
-              <a:t>At minimum, tests should be organized into valid and invalid label tests. Although this is embedded in the name, sorting them will make it easier to find the test that you need, especially as the number of tests grows.</a:t>
-            </a:r>
-          </a:p>
-        </p:txBody>
-      </p:sp>
-    </p:spTree>
-  </p:cSld>
-</p:sld>
-</file>
-
-<file path=ppt/slides/slide27.xml><?xml version="1.0" encoding="utf-8"?>
-<p:sld xmlns:a="http://schemas.openxmlformats.org/drawingml/2006/main" xmlns:r="http://schemas.openxmlformats.org/officeDocument/2006/relationships" xmlns:p="http://schemas.openxmlformats.org/presentationml/2006/main">
-  <p:cSld>
-    <p:spTree>
-      <p:nvGrpSpPr>
-        <p:cNvPr id="1" name=""/>
-        <p:cNvGrpSpPr/>
-        <p:nvPr/>
-      </p:nvGrpSpPr>
-      <p:grpSpPr>
-        <a:xfrm>
-          <a:off x="0" y="0"/>
-          <a:ext cx="0" cy="0"/>
-          <a:chOff x="0" y="0"/>
-          <a:chExt cx="0" cy="0"/>
-        </a:xfrm>
-      </p:grpSpPr>
-      <p:sp>
-        <p:nvSpPr>
-          <p:cNvPr id="2" name="Title 1"/>
-          <p:cNvSpPr>
-            <a:spLocks noGrp="1"/>
-          </p:cNvSpPr>
-          <p:nvPr>
-            <p:ph type="title"/>
-          </p:nvPr>
-        </p:nvSpPr>
-        <p:spPr/>
-        <p:txBody>
-          <a:bodyPr/>
-          <a:lstStyle/>
-          <a:p>
-            <a:pPr lvl="0" indent="0" marL="0">
-              <a:buNone/>
-            </a:pPr>
-            <a:r>
-              <a:rPr/>
-              <a:t>Static analysis tools</a:t>
-            </a:r>
-          </a:p>
-        </p:txBody>
-      </p:sp>
-      <p:sp>
-        <p:nvSpPr>
-          <p:cNvPr id="3" name="Content Placeholder 2"/>
-          <p:cNvSpPr>
-            <a:spLocks noGrp="1"/>
-          </p:cNvSpPr>
-          <p:nvPr>
-            <p:ph idx="1"/>
-          </p:nvPr>
-        </p:nvSpPr>
-        <p:spPr/>
-        <p:txBody>
-          <a:bodyPr/>
-          <a:lstStyle/>
-          <a:p>
-            <a:pPr lvl="0"/>
-            <a:r>
-              <a:rPr/>
-              <a:t>Validate tool</a:t>
-            </a:r>
-          </a:p>
-          <a:p>
-            <a:pPr lvl="1"/>
-            <a:r>
-              <a:rPr/>
-              <a:t>Ingest LDD files are part of the PDS4 information model, just like products. This means that the validator can run against them.</a:t>
-            </a:r>
-          </a:p>
-          <a:p>
-            <a:pPr lvl="0"/>
-            <a:r>
-              <a:rPr/>
-              <a:t>LDDTool</a:t>
-            </a:r>
-          </a:p>
-          <a:p>
-            <a:pPr lvl="1"/>
-            <a:r>
-              <a:rPr/>
-              <a:t>Catches many problems with a dictionary while it is being generated.</a:t>
-            </a:r>
-          </a:p>
-          <a:p>
-            <a:pPr lvl="0"/>
-            <a:r>
-              <a:rPr/>
-              <a:t>LDDPreflight</a:t>
-            </a:r>
-          </a:p>
-          <a:p>
-            <a:pPr lvl="1"/>
-            <a:r>
-              <a:rPr/>
-              <a:t>Runs several of the new rules proposed at this meeting, and raises any voilations.</a:t>
-            </a:r>
-          </a:p>
-          <a:p>
-            <a:pPr lvl="0"/>
-            <a:r>
-              <a:rPr/>
-              <a:t>These should be run before the regression tests, since errors at this point are easier to catch, and some of them will prevent the dictionary from being generated, or will prevent regression tests from passing.</a:t>
-            </a:r>
-          </a:p>
-        </p:txBody>
-      </p:sp>
-    </p:spTree>
-  </p:cSld>
-</p:sld>
-</file>
-
-<file path=ppt/slides/slide28.xml><?xml version="1.0" encoding="utf-8"?>
 <p:sld xmlns:a="http://schemas.openxmlformats.org/drawingml/2006/main" xmlns:r="http://schemas.openxmlformats.org/officeDocument/2006/relationships" xmlns:p="http://schemas.openxmlformats.org/presentationml/2006/main">
   <p:cSld>
     <p:spTree>
@@ -5430,7 +3623,7 @@
 </p:sld>
 </file>
 
-<file path=ppt/slides/slide29.xml><?xml version="1.0" encoding="utf-8"?>
+<file path=ppt/slides/slide13.xml><?xml version="1.0" encoding="utf-8"?>
 <p:sld xmlns:a="http://schemas.openxmlformats.org/drawingml/2006/main" xmlns:r="http://schemas.openxmlformats.org/officeDocument/2006/relationships" xmlns:p="http://schemas.openxmlformats.org/presentationml/2006/main">
   <p:cSld>
     <p:spTree>
@@ -5581,119 +3774,7 @@
 </p:sld>
 </file>
 
-<file path=ppt/slides/slide3.xml><?xml version="1.0" encoding="utf-8"?>
-<p:sld xmlns:a="http://schemas.openxmlformats.org/drawingml/2006/main" xmlns:r="http://schemas.openxmlformats.org/officeDocument/2006/relationships" xmlns:p="http://schemas.openxmlformats.org/presentationml/2006/main">
-  <p:cSld>
-    <p:spTree>
-      <p:nvGrpSpPr>
-        <p:cNvPr id="1" name=""/>
-        <p:cNvGrpSpPr/>
-        <p:nvPr/>
-      </p:nvGrpSpPr>
-      <p:grpSpPr>
-        <a:xfrm>
-          <a:off x="0" y="0"/>
-          <a:ext cx="0" cy="0"/>
-          <a:chOff x="0" y="0"/>
-          <a:chExt cx="0" cy="0"/>
-        </a:xfrm>
-      </p:grpSpPr>
-      <p:sp>
-        <p:nvSpPr>
-          <p:cNvPr id="2" name="Title 1"/>
-          <p:cNvSpPr>
-            <a:spLocks noGrp="1"/>
-          </p:cNvSpPr>
-          <p:nvPr>
-            <p:ph type="title"/>
-          </p:nvPr>
-        </p:nvSpPr>
-        <p:spPr/>
-        <p:txBody>
-          <a:bodyPr/>
-          <a:lstStyle/>
-          <a:p>
-            <a:pPr lvl="0" indent="0" marL="0">
-              <a:buNone/>
-            </a:pPr>
-            <a:r>
-              <a:rPr/>
-              <a:t>Testing methodologies</a:t>
-            </a:r>
-          </a:p>
-        </p:txBody>
-      </p:sp>
-      <p:sp>
-        <p:nvSpPr>
-          <p:cNvPr id="3" name="Content Placeholder 2"/>
-          <p:cNvSpPr>
-            <a:spLocks noGrp="1"/>
-          </p:cNvSpPr>
-          <p:nvPr>
-            <p:ph idx="1"/>
-          </p:nvPr>
-        </p:nvSpPr>
-        <p:spPr/>
-        <p:txBody>
-          <a:bodyPr/>
-          <a:lstStyle/>
-          <a:p>
-            <a:pPr lvl="0"/>
-            <a:r>
-              <a:rPr/>
-              <a:t>Regression testing</a:t>
-            </a:r>
-          </a:p>
-          <a:p>
-            <a:pPr lvl="1"/>
-            <a:r>
-              <a:rPr/>
-              <a:t>This method generates the dictionary, and validates special labels against the dictionary.</a:t>
-            </a:r>
-          </a:p>
-          <a:p>
-            <a:pPr lvl="2"/>
-            <a:r>
-              <a:rPr/>
-              <a:t>Thse labels are specifically designed to pass or fail validation</a:t>
-            </a:r>
-          </a:p>
-          <a:p>
-            <a:pPr lvl="2"/>
-            <a:r>
-              <a:rPr/>
-              <a:t>If the validation result does not match the intent of the label, then there is a problem with the dictionary.</a:t>
-            </a:r>
-          </a:p>
-          <a:p>
-            <a:pPr lvl="0"/>
-            <a:r>
-              <a:rPr/>
-              <a:t>Static analysis</a:t>
-            </a:r>
-          </a:p>
-          <a:p>
-            <a:pPr lvl="1"/>
-            <a:r>
-              <a:rPr/>
-              <a:t>This evaluates the dictionary according to predefined rules, without necessarily comparing it against labels.</a:t>
-            </a:r>
-          </a:p>
-          <a:p>
-            <a:pPr lvl="0"/>
-            <a:r>
-              <a:rPr/>
-              <a:t>Regression testing and static analysis are complementary tools, and both are needed to fully evaluate a dictionary.</a:t>
-            </a:r>
-          </a:p>
-        </p:txBody>
-      </p:sp>
-    </p:spTree>
-  </p:cSld>
-</p:sld>
-</file>
-
-<file path=ppt/slides/slide30.xml><?xml version="1.0" encoding="utf-8"?>
+<file path=ppt/slides/slide14.xml><?xml version="1.0" encoding="utf-8"?>
 <p:sld xmlns:a="http://schemas.openxmlformats.org/drawingml/2006/main" xmlns:r="http://schemas.openxmlformats.org/officeDocument/2006/relationships" xmlns:p="http://schemas.openxmlformats.org/presentationml/2006/main">
   <p:cSld>
     <p:spTree>
@@ -5805,6 +3886,237 @@
             <a:r>
               <a:rPr/>
               <a:t>PPT</a:t>
+            </a:r>
+          </a:p>
+        </p:txBody>
+      </p:sp>
+    </p:spTree>
+  </p:cSld>
+</p:sld>
+</file>
+
+<file path=ppt/slides/slide2.xml><?xml version="1.0" encoding="utf-8"?>
+<p:sld xmlns:a="http://schemas.openxmlformats.org/drawingml/2006/main" xmlns:r="http://schemas.openxmlformats.org/officeDocument/2006/relationships" xmlns:p="http://schemas.openxmlformats.org/presentationml/2006/main">
+  <p:cSld>
+    <p:spTree>
+      <p:nvGrpSpPr>
+        <p:cNvPr id="1" name=""/>
+        <p:cNvGrpSpPr/>
+        <p:nvPr/>
+      </p:nvGrpSpPr>
+      <p:grpSpPr>
+        <a:xfrm>
+          <a:off x="0" y="0"/>
+          <a:ext cx="0" cy="0"/>
+          <a:chOff x="0" y="0"/>
+          <a:chExt cx="0" cy="0"/>
+        </a:xfrm>
+      </p:grpSpPr>
+      <p:sp>
+        <p:nvSpPr>
+          <p:cNvPr id="2" name="Title 1"/>
+          <p:cNvSpPr>
+            <a:spLocks noGrp="1"/>
+          </p:cNvSpPr>
+          <p:nvPr>
+            <p:ph type="title"/>
+          </p:nvPr>
+        </p:nvSpPr>
+        <p:spPr/>
+        <p:txBody>
+          <a:bodyPr/>
+          <a:lstStyle/>
+          <a:p>
+            <a:pPr lvl="0" indent="0" marL="0">
+              <a:buNone/>
+            </a:pPr>
+            <a:r>
+              <a:rPr/>
+              <a:t>Why Tests?</a:t>
+            </a:r>
+          </a:p>
+        </p:txBody>
+      </p:sp>
+      <p:sp>
+        <p:nvSpPr>
+          <p:cNvPr id="3" name="Content Placeholder 2"/>
+          <p:cNvSpPr>
+            <a:spLocks noGrp="1"/>
+          </p:cNvSpPr>
+          <p:nvPr>
+            <p:ph idx="1"/>
+          </p:nvPr>
+        </p:nvSpPr>
+        <p:spPr/>
+        <p:txBody>
+          <a:bodyPr/>
+          <a:lstStyle/>
+          <a:p>
+            <a:pPr lvl="0"/>
+            <a:r>
+              <a:rPr/>
+              <a:t>Passing tests provide examples of how the dictionary is used</a:t>
+            </a:r>
+          </a:p>
+          <a:p>
+            <a:pPr lvl="1"/>
+            <a:r>
+              <a:rPr/>
+              <a:t>This is not a substitute for documentation, but can supplement it</a:t>
+            </a:r>
+          </a:p>
+          <a:p>
+            <a:pPr lvl="0"/>
+            <a:r>
+              <a:rPr/>
+              <a:t>Ensure that every class definition works as intended</a:t>
+            </a:r>
+          </a:p>
+          <a:p>
+            <a:pPr lvl="0"/>
+            <a:r>
+              <a:rPr/>
+              <a:t>Ensures that schematron tests are running</a:t>
+            </a:r>
+          </a:p>
+          <a:p>
+            <a:pPr lvl="1"/>
+            <a:r>
+              <a:rPr/>
+              <a:t>Ensures that your schematron rules are correct</a:t>
+            </a:r>
+          </a:p>
+          <a:p>
+            <a:pPr lvl="0"/>
+            <a:r>
+              <a:rPr/>
+              <a:t>Prevent regressions</a:t>
+            </a:r>
+          </a:p>
+          <a:p>
+            <a:pPr lvl="1"/>
+            <a:r>
+              <a:rPr/>
+              <a:t>Regressions are unintended side-effects created by making changes</a:t>
+            </a:r>
+          </a:p>
+          <a:p>
+            <a:pPr lvl="0"/>
+            <a:r>
+              <a:rPr/>
+              <a:t>Warns if changes are not backwards-compatible</a:t>
+            </a:r>
+          </a:p>
+        </p:txBody>
+      </p:sp>
+    </p:spTree>
+  </p:cSld>
+</p:sld>
+</file>
+
+<file path=ppt/slides/slide3.xml><?xml version="1.0" encoding="utf-8"?>
+<p:sld xmlns:a="http://schemas.openxmlformats.org/drawingml/2006/main" xmlns:r="http://schemas.openxmlformats.org/officeDocument/2006/relationships" xmlns:p="http://schemas.openxmlformats.org/presentationml/2006/main">
+  <p:cSld>
+    <p:spTree>
+      <p:nvGrpSpPr>
+        <p:cNvPr id="1" name=""/>
+        <p:cNvGrpSpPr/>
+        <p:nvPr/>
+      </p:nvGrpSpPr>
+      <p:grpSpPr>
+        <a:xfrm>
+          <a:off x="0" y="0"/>
+          <a:ext cx="0" cy="0"/>
+          <a:chOff x="0" y="0"/>
+          <a:chExt cx="0" cy="0"/>
+        </a:xfrm>
+      </p:grpSpPr>
+      <p:sp>
+        <p:nvSpPr>
+          <p:cNvPr id="2" name="Title 1"/>
+          <p:cNvSpPr>
+            <a:spLocks noGrp="1"/>
+          </p:cNvSpPr>
+          <p:nvPr>
+            <p:ph type="title"/>
+          </p:nvPr>
+        </p:nvSpPr>
+        <p:spPr/>
+        <p:txBody>
+          <a:bodyPr/>
+          <a:lstStyle/>
+          <a:p>
+            <a:pPr lvl="0" indent="0" marL="0">
+              <a:buNone/>
+            </a:pPr>
+            <a:r>
+              <a:rPr/>
+              <a:t>Testing methodologies</a:t>
+            </a:r>
+          </a:p>
+        </p:txBody>
+      </p:sp>
+      <p:sp>
+        <p:nvSpPr>
+          <p:cNvPr id="3" name="Content Placeholder 2"/>
+          <p:cNvSpPr>
+            <a:spLocks noGrp="1"/>
+          </p:cNvSpPr>
+          <p:nvPr>
+            <p:ph idx="1"/>
+          </p:nvPr>
+        </p:nvSpPr>
+        <p:spPr/>
+        <p:txBody>
+          <a:bodyPr/>
+          <a:lstStyle/>
+          <a:p>
+            <a:pPr lvl="0"/>
+            <a:r>
+              <a:rPr/>
+              <a:t>Regression testing</a:t>
+            </a:r>
+          </a:p>
+          <a:p>
+            <a:pPr lvl="1"/>
+            <a:r>
+              <a:rPr/>
+              <a:t>This method generates the dictionary, and validates special labels against the dictionary.</a:t>
+            </a:r>
+          </a:p>
+          <a:p>
+            <a:pPr lvl="2"/>
+            <a:r>
+              <a:rPr/>
+              <a:t>Thse labels are specifically designed to pass or fail validation</a:t>
+            </a:r>
+          </a:p>
+          <a:p>
+            <a:pPr lvl="2"/>
+            <a:r>
+              <a:rPr/>
+              <a:t>If the validation result does not match the intent of the label, then there is a problem with the dictionary.</a:t>
+            </a:r>
+          </a:p>
+          <a:p>
+            <a:pPr lvl="0"/>
+            <a:r>
+              <a:rPr/>
+              <a:t>Static analysis</a:t>
+            </a:r>
+          </a:p>
+          <a:p>
+            <a:pPr lvl="1"/>
+            <a:r>
+              <a:rPr/>
+              <a:t>This evaluates the dictionary according to predefined rules, without necessarily comparing it against labels.</a:t>
+            </a:r>
+          </a:p>
+          <a:p>
+            <a:pPr lvl="0"/>
+            <a:r>
+              <a:rPr/>
+              <a:t>Regression testing and static analysis are complementary tools, and both are needed to fully evaluate a dictionary.</a:t>
             </a:r>
           </a:p>
         </p:txBody>

</xml_diff>

<commit_message>
added pdf versions of the presentation
</commit_message>
<xml_diff>
--- a/LDDTesting/stone-LDDTestingOverview.pptx
+++ b/LDDTesting/stone-LDDTestingOverview.pptx
@@ -19,6 +19,7 @@
     <p:sldId id="267" r:id="rId13"/>
     <p:sldId id="268" r:id="rId14"/>
     <p:sldId id="269" r:id="rId15"/>
+    <p:sldId id="270" r:id="rId16"/>
   </p:sldIdLst>
   <p:sldSz cx="9144000" cy="5143500" type="screen16x9"/>
   <p:notesSz cx="6858000" cy="9144000"/>
@@ -3886,6 +3887,127 @@
             <a:r>
               <a:rPr/>
               <a:t>PPT</a:t>
+            </a:r>
+          </a:p>
+        </p:txBody>
+      </p:sp>
+    </p:spTree>
+  </p:cSld>
+</p:sld>
+</file>
+
+<file path=ppt/slides/slide15.xml><?xml version="1.0" encoding="utf-8"?>
+<p:sld xmlns:a="http://schemas.openxmlformats.org/drawingml/2006/main" xmlns:r="http://schemas.openxmlformats.org/officeDocument/2006/relationships" xmlns:p="http://schemas.openxmlformats.org/presentationml/2006/main">
+  <p:cSld>
+    <p:spTree>
+      <p:nvGrpSpPr>
+        <p:cNvPr id="1" name=""/>
+        <p:cNvGrpSpPr/>
+        <p:nvPr/>
+      </p:nvGrpSpPr>
+      <p:grpSpPr>
+        <a:xfrm>
+          <a:off x="0" y="0"/>
+          <a:ext cx="0" cy="0"/>
+          <a:chOff x="0" y="0"/>
+          <a:chExt cx="0" cy="0"/>
+        </a:xfrm>
+      </p:grpSpPr>
+      <p:sp>
+        <p:nvSpPr>
+          <p:cNvPr id="4" name="Text Placeholder 3"/>
+          <p:cNvSpPr>
+            <a:spLocks noGrp="1"/>
+          </p:cNvSpPr>
+          <p:nvPr>
+            <p:ph idx="2" sz="half" type="body"/>
+          </p:nvPr>
+        </p:nvSpPr>
+        <p:spPr/>
+        <p:txBody>
+          <a:bodyPr/>
+          <a:lstStyle/>
+          <a:p>
+            <a:pPr lvl="0" indent="0" marL="0">
+              <a:spcBef>
+                <a:spcPts val="3000"/>
+              </a:spcBef>
+              <a:buNone/>
+            </a:pPr>
+            <a:r>
+              <a:rPr b="1"/>
+              <a:t>PDF</a:t>
+            </a:r>
+          </a:p>
+          <a:p>
+            <a:pPr lvl="0" indent="0" marL="0">
+              <a:buNone/>
+            </a:pPr>
+            <a:r>
+              <a:rPr>
+                <a:hlinkClick r:id="rId2"/>
+              </a:rPr>
+              <a:t>https://github.com/sbn-psi/dmsp/raw/main/LDDTesting/stone-LDDTestingOverview.pdf</a:t>
+            </a:r>
+          </a:p>
+        </p:txBody>
+      </p:sp>
+      <p:pic>
+        <p:nvPicPr>
+          <p:cNvPr descr="fig:  images/overview/pdf.png" id="0" name="Picture 1"/>
+          <p:cNvPicPr>
+            <a:picLocks noGrp="1" noChangeAspect="1"/>
+          </p:cNvPicPr>
+          <p:nvPr/>
+        </p:nvPicPr>
+        <p:blipFill>
+          <a:blip r:embed="rId3"/>
+          <a:stretch>
+            <a:fillRect/>
+          </a:stretch>
+        </p:blipFill>
+        <p:spPr bwMode="auto">
+          <a:xfrm>
+            <a:off x="4191000" y="203200"/>
+            <a:ext cx="3873500" cy="3873500"/>
+          </a:xfrm>
+          <a:prstGeom prst="rect">
+            <a:avLst/>
+          </a:prstGeom>
+          <a:noFill/>
+          <a:ln w="9525">
+            <a:noFill/>
+            <a:headEnd/>
+            <a:tailEnd/>
+          </a:ln>
+        </p:spPr>
+      </p:pic>
+      <p:sp>
+        <p:nvSpPr>
+          <p:cNvPr id="1" name="TextBox 3"/>
+          <p:cNvSpPr txBox="1"/>
+          <p:nvPr/>
+        </p:nvSpPr>
+        <p:spPr>
+          <a:xfrm>
+            <a:off x="3568700" y="4076700"/>
+            <a:ext cx="5105400" cy="508000"/>
+          </a:xfrm>
+          <a:prstGeom prst="rect">
+            <a:avLst/>
+          </a:prstGeom>
+          <a:noFill/>
+        </p:spPr>
+        <p:txBody>
+          <a:bodyPr/>
+          <a:lstStyle/>
+          <a:p>
+            <a:pPr lvl="0" indent="0" marL="0" algn="ctr">
+              <a:buNone/>
+            </a:pPr>
+            <a:r>
+              <a:rPr/>
+              <a:t>PDF</a:t>
             </a:r>
           </a:p>
         </p:txBody>

</xml_diff>

<commit_message>
Split the static analysis slide
</commit_message>
<xml_diff>
--- a/LDDTesting/stone-LDDTestingOverview.pptx
+++ b/LDDTesting/stone-LDDTestingOverview.pptx
@@ -20,6 +20,7 @@
     <p:sldId id="268" r:id="rId14"/>
     <p:sldId id="269" r:id="rId15"/>
     <p:sldId id="270" r:id="rId16"/>
+    <p:sldId id="271" r:id="rId17"/>
   </p:sldIdLst>
   <p:sldSz cx="9144000" cy="5143500" type="screen16x9"/>
   <p:notesSz cx="6858000" cy="9144000"/>
@@ -3452,13 +3453,6 @@
               <a:t>Runs several of the new rules proposed at this meeting, and raises any voilations.</a:t>
             </a:r>
           </a:p>
-          <a:p>
-            <a:pPr lvl="0"/>
-            <a:r>
-              <a:rPr/>
-              <a:t>These should be run before the regression tests, since errors at this point are easier to catch, and some of them will prevent the dictionary from being generated, or will prevent regression tests from passing.</a:t>
-            </a:r>
-          </a:p>
         </p:txBody>
       </p:sp>
     </p:spTree>
@@ -3467,6 +3461,76 @@
 </file>
 
 <file path=ppt/slides/slide12.xml><?xml version="1.0" encoding="utf-8"?>
+<p:sld xmlns:a="http://schemas.openxmlformats.org/drawingml/2006/main" xmlns:r="http://schemas.openxmlformats.org/officeDocument/2006/relationships" xmlns:p="http://schemas.openxmlformats.org/presentationml/2006/main">
+  <p:cSld>
+    <p:spTree>
+      <p:nvGrpSpPr>
+        <p:cNvPr id="1" name=""/>
+        <p:cNvGrpSpPr/>
+        <p:nvPr/>
+      </p:nvGrpSpPr>
+      <p:grpSpPr>
+        <a:xfrm>
+          <a:off x="0" y="0"/>
+          <a:ext cx="0" cy="0"/>
+          <a:chOff x="0" y="0"/>
+          <a:chExt cx="0" cy="0"/>
+        </a:xfrm>
+      </p:grpSpPr>
+      <p:sp>
+        <p:nvSpPr>
+          <p:cNvPr id="2" name="Title 1"/>
+          <p:cNvSpPr>
+            <a:spLocks noGrp="1"/>
+          </p:cNvSpPr>
+          <p:nvPr>
+            <p:ph type="title"/>
+          </p:nvPr>
+        </p:nvSpPr>
+        <p:spPr/>
+        <p:txBody>
+          <a:bodyPr/>
+          <a:lstStyle/>
+          <a:p>
+            <a:pPr lvl="0" indent="0" marL="0">
+              <a:buNone/>
+            </a:pPr>
+            <a:r>
+              <a:rPr/>
+              <a:t>Using static analysis tools</a:t>
+            </a:r>
+          </a:p>
+        </p:txBody>
+      </p:sp>
+      <p:sp>
+        <p:nvSpPr>
+          <p:cNvPr id="3" name="Content Placeholder 2"/>
+          <p:cNvSpPr>
+            <a:spLocks noGrp="1"/>
+          </p:cNvSpPr>
+          <p:nvPr>
+            <p:ph idx="1"/>
+          </p:nvPr>
+        </p:nvSpPr>
+        <p:spPr/>
+        <p:txBody>
+          <a:bodyPr/>
+          <a:lstStyle/>
+          <a:p>
+            <a:pPr lvl="0"/>
+            <a:r>
+              <a:rPr/>
+              <a:t>These should be run before the regression tests, since errors at this point are easier to catch, and some of them will prevent the dictionary from being generated, or will prevent regression tests from passing.</a:t>
+            </a:r>
+          </a:p>
+        </p:txBody>
+      </p:sp>
+    </p:spTree>
+  </p:cSld>
+</p:sld>
+</file>
+
+<file path=ppt/slides/slide13.xml><?xml version="1.0" encoding="utf-8"?>
 <p:sld xmlns:a="http://schemas.openxmlformats.org/drawingml/2006/main" xmlns:r="http://schemas.openxmlformats.org/officeDocument/2006/relationships" xmlns:p="http://schemas.openxmlformats.org/presentationml/2006/main">
   <p:cSld>
     <p:spTree>
@@ -3624,7 +3688,7 @@
 </p:sld>
 </file>
 
-<file path=ppt/slides/slide13.xml><?xml version="1.0" encoding="utf-8"?>
+<file path=ppt/slides/slide14.xml><?xml version="1.0" encoding="utf-8"?>
 <p:sld xmlns:a="http://schemas.openxmlformats.org/drawingml/2006/main" xmlns:r="http://schemas.openxmlformats.org/officeDocument/2006/relationships" xmlns:p="http://schemas.openxmlformats.org/presentationml/2006/main">
   <p:cSld>
     <p:spTree>
@@ -3775,7 +3839,7 @@
 </p:sld>
 </file>
 
-<file path=ppt/slides/slide14.xml><?xml version="1.0" encoding="utf-8"?>
+<file path=ppt/slides/slide15.xml><?xml version="1.0" encoding="utf-8"?>
 <p:sld xmlns:a="http://schemas.openxmlformats.org/drawingml/2006/main" xmlns:r="http://schemas.openxmlformats.org/officeDocument/2006/relationships" xmlns:p="http://schemas.openxmlformats.org/presentationml/2006/main">
   <p:cSld>
     <p:spTree>
@@ -3896,7 +3960,7 @@
 </p:sld>
 </file>
 
-<file path=ppt/slides/slide15.xml><?xml version="1.0" encoding="utf-8"?>
+<file path=ppt/slides/slide16.xml><?xml version="1.0" encoding="utf-8"?>
 <p:sld xmlns:a="http://schemas.openxmlformats.org/drawingml/2006/main" xmlns:r="http://schemas.openxmlformats.org/officeDocument/2006/relationships" xmlns:p="http://schemas.openxmlformats.org/presentationml/2006/main">
   <p:cSld>
     <p:spTree>

</xml_diff>

<commit_message>
Added more descriptions of the display dictionary tests
</commit_message>
<xml_diff>
--- a/LDDTesting/stone-LDDTestingOverview.pptx
+++ b/LDDTesting/stone-LDDTestingOverview.pptx
@@ -3288,6 +3288,41 @@
               <a:t>Demonstrate simple passing and failing tests.</a:t>
             </a:r>
           </a:p>
+          <a:p>
+            <a:pPr lvl="0"/>
+            <a:r>
+              <a:rPr/>
+              <a:t>The display dictionary contains a single type of schematron rule</a:t>
+            </a:r>
+          </a:p>
+          <a:p>
+            <a:pPr lvl="1"/>
+            <a:r>
+              <a:rPr/>
+              <a:t>The horizontal display axis and vertial display axis each must match an axis name in the data object.</a:t>
+            </a:r>
+          </a:p>
+          <a:p>
+            <a:pPr lvl="0"/>
+            <a:r>
+              <a:rPr/>
+              <a:t>The tests consist of a valid label and two failing labels</a:t>
+            </a:r>
+          </a:p>
+          <a:p>
+            <a:pPr lvl="1"/>
+            <a:r>
+              <a:rPr/>
+              <a:t>One where the horizontal display axis name doesn’t match</a:t>
+            </a:r>
+          </a:p>
+          <a:p>
+            <a:pPr lvl="1"/>
+            <a:r>
+              <a:rPr/>
+              <a:t>One where the vertical display axis name doesn’t math</a:t>
+            </a:r>
+          </a:p>
         </p:txBody>
       </p:sp>
       <p:pic>
@@ -4274,7 +4309,7 @@
             <a:pPr lvl="2"/>
             <a:r>
               <a:rPr/>
-              <a:t>Thse labels are specifically designed to pass or fail validation</a:t>
+              <a:t>These labels are specifically designed to pass or fail validation</a:t>
             </a:r>
           </a:p>
           <a:p>
@@ -4379,14 +4414,14 @@
             <a:pPr lvl="1"/>
             <a:r>
               <a:rPr/>
-              <a:t>Generate the LDDs</a:t>
+              <a:t>Generate and LDD from the ingest file</a:t>
             </a:r>
           </a:p>
           <a:p>
             <a:pPr lvl="1"/>
             <a:r>
               <a:rPr/>
-              <a:t>Run validate on every label with the generated LDD</a:t>
+              <a:t>Run validate on every label using the generated LDD</a:t>
             </a:r>
           </a:p>
           <a:p>
@@ -4400,7 +4435,7 @@
             <a:pPr lvl="1"/>
             <a:r>
               <a:rPr/>
-              <a:t>Mark the branch as passing/failing based on the results of the test</a:t>
+              <a:t>Mark the commit as passing/failing based on the results of the test</a:t>
             </a:r>
           </a:p>
         </p:txBody>
@@ -4466,6 +4501,18 @@
         <p:txBody>
           <a:bodyPr/>
           <a:lstStyle/>
+          <a:p>
+            <a:pPr lvl="0" indent="0" marL="0">
+              <a:spcBef>
+                <a:spcPts val="3000"/>
+              </a:spcBef>
+              <a:buNone/>
+            </a:pPr>
+            <a:r>
+              <a:rPr b="1"/>
+              <a:t>Objectives</a:t>
+            </a:r>
+          </a:p>
           <a:p>
             <a:pPr lvl="0"/>
             <a:r>

</xml_diff>

<commit_message>
Added some notes about testing locally
</commit_message>
<xml_diff>
--- a/LDDTesting/stone-LDDTestingOverview.pptx
+++ b/LDDTesting/stone-LDDTestingOverview.pptx
@@ -21,6 +21,7 @@
     <p:sldId id="269" r:id="rId15"/>
     <p:sldId id="270" r:id="rId16"/>
     <p:sldId id="271" r:id="rId17"/>
+    <p:sldId id="272" r:id="rId18"/>
   </p:sldIdLst>
   <p:sldSz cx="9144000" cy="5143500" type="screen16x9"/>
   <p:notesSz cx="6858000" cy="9144000"/>
@@ -3224,6 +3225,145 @@
             <p:ph type="title"/>
           </p:nvPr>
         </p:nvSpPr>
+        <p:spPr/>
+        <p:txBody>
+          <a:bodyPr/>
+          <a:lstStyle/>
+          <a:p>
+            <a:pPr lvl="0" indent="0" marL="0">
+              <a:buNone/>
+            </a:pPr>
+            <a:r>
+              <a:rPr/>
+              <a:t>How do you write tests?</a:t>
+            </a:r>
+          </a:p>
+        </p:txBody>
+      </p:sp>
+      <p:sp>
+        <p:nvSpPr>
+          <p:cNvPr id="3" name="Content Placeholder 2"/>
+          <p:cNvSpPr>
+            <a:spLocks noGrp="1"/>
+          </p:cNvSpPr>
+          <p:nvPr>
+            <p:ph idx="1"/>
+          </p:nvPr>
+        </p:nvSpPr>
+        <p:spPr/>
+        <p:txBody>
+          <a:bodyPr/>
+          <a:lstStyle/>
+          <a:p>
+            <a:pPr lvl="0"/>
+            <a:r>
+              <a:rPr/>
+              <a:t>Create a label</a:t>
+            </a:r>
+          </a:p>
+          <a:p>
+            <a:pPr lvl="1"/>
+            <a:r>
+              <a:rPr/>
+              <a:t>This could involve creating a completely synthetic label, or using an existing label</a:t>
+            </a:r>
+          </a:p>
+          <a:p>
+            <a:pPr lvl="1"/>
+            <a:r>
+              <a:rPr/>
+              <a:t>The simpler the part that is not under test is, the better.</a:t>
+            </a:r>
+          </a:p>
+          <a:p>
+            <a:pPr lvl="2"/>
+            <a:r>
+              <a:rPr/>
+              <a:t>Parts that are not being tested just obscure the purpose of the test.</a:t>
+            </a:r>
+          </a:p>
+          <a:p>
+            <a:pPr lvl="0"/>
+            <a:r>
+              <a:rPr/>
+              <a:t>If this is an invalid label test, introduce errors</a:t>
+            </a:r>
+          </a:p>
+          <a:p>
+            <a:pPr lvl="0"/>
+            <a:r>
+              <a:rPr/>
+              <a:t>Mark the label as a valid label test or an invalid label test</a:t>
+            </a:r>
+          </a:p>
+          <a:p>
+            <a:pPr lvl="1"/>
+            <a:r>
+              <a:rPr/>
+              <a:t>Add either </a:t>
+            </a:r>
+            <a:r>
+              <a:rPr>
+                <a:latin typeface="Courier"/>
+              </a:rPr>
+              <a:t>_VALID</a:t>
+            </a:r>
+            <a:r>
+              <a:rPr/>
+              <a:t> or </a:t>
+            </a:r>
+            <a:r>
+              <a:rPr>
+                <a:latin typeface="Courier"/>
+              </a:rPr>
+              <a:t>_FAIL</a:t>
+            </a:r>
+            <a:r>
+              <a:rPr/>
+              <a:t> to the end of the filename</a:t>
+            </a:r>
+          </a:p>
+          <a:p>
+            <a:pPr lvl="0"/>
+            <a:r>
+              <a:rPr/>
+              <a:t>Commit the label</a:t>
+            </a:r>
+          </a:p>
+        </p:txBody>
+      </p:sp>
+    </p:spTree>
+  </p:cSld>
+</p:sld>
+</file>
+
+<file path=ppt/slides/slide11.xml><?xml version="1.0" encoding="utf-8"?>
+<p:sld xmlns:a="http://schemas.openxmlformats.org/drawingml/2006/main" xmlns:r="http://schemas.openxmlformats.org/officeDocument/2006/relationships" xmlns:p="http://schemas.openxmlformats.org/presentationml/2006/main">
+  <p:cSld>
+    <p:spTree>
+      <p:nvGrpSpPr>
+        <p:cNvPr id="1" name=""/>
+        <p:cNvGrpSpPr/>
+        <p:nvPr/>
+      </p:nvGrpSpPr>
+      <p:grpSpPr>
+        <a:xfrm>
+          <a:off x="0" y="0"/>
+          <a:ext cx="0" cy="0"/>
+          <a:chOff x="0" y="0"/>
+          <a:chExt cx="0" cy="0"/>
+        </a:xfrm>
+      </p:grpSpPr>
+      <p:sp>
+        <p:nvSpPr>
+          <p:cNvPr id="2" name="Title 1"/>
+          <p:cNvSpPr>
+            <a:spLocks noGrp="1"/>
+          </p:cNvSpPr>
+          <p:nvPr>
+            <p:ph type="title"/>
+          </p:nvPr>
+        </p:nvSpPr>
         <p:spPr>
           <a:xfrm>
             <a:off x="457201" y="204787"/>
@@ -3390,111 +3530,6 @@
 </p:sld>
 </file>
 
-<file path=ppt/slides/slide11.xml><?xml version="1.0" encoding="utf-8"?>
-<p:sld xmlns:a="http://schemas.openxmlformats.org/drawingml/2006/main" xmlns:r="http://schemas.openxmlformats.org/officeDocument/2006/relationships" xmlns:p="http://schemas.openxmlformats.org/presentationml/2006/main">
-  <p:cSld>
-    <p:spTree>
-      <p:nvGrpSpPr>
-        <p:cNvPr id="1" name=""/>
-        <p:cNvGrpSpPr/>
-        <p:nvPr/>
-      </p:nvGrpSpPr>
-      <p:grpSpPr>
-        <a:xfrm>
-          <a:off x="0" y="0"/>
-          <a:ext cx="0" cy="0"/>
-          <a:chOff x="0" y="0"/>
-          <a:chExt cx="0" cy="0"/>
-        </a:xfrm>
-      </p:grpSpPr>
-      <p:sp>
-        <p:nvSpPr>
-          <p:cNvPr id="2" name="Title 1"/>
-          <p:cNvSpPr>
-            <a:spLocks noGrp="1"/>
-          </p:cNvSpPr>
-          <p:nvPr>
-            <p:ph type="title"/>
-          </p:nvPr>
-        </p:nvSpPr>
-        <p:spPr/>
-        <p:txBody>
-          <a:bodyPr/>
-          <a:lstStyle/>
-          <a:p>
-            <a:pPr lvl="0" indent="0" marL="0">
-              <a:buNone/>
-            </a:pPr>
-            <a:r>
-              <a:rPr/>
-              <a:t>Static analysis tools</a:t>
-            </a:r>
-          </a:p>
-        </p:txBody>
-      </p:sp>
-      <p:sp>
-        <p:nvSpPr>
-          <p:cNvPr id="3" name="Content Placeholder 2"/>
-          <p:cNvSpPr>
-            <a:spLocks noGrp="1"/>
-          </p:cNvSpPr>
-          <p:nvPr>
-            <p:ph idx="1"/>
-          </p:nvPr>
-        </p:nvSpPr>
-        <p:spPr/>
-        <p:txBody>
-          <a:bodyPr/>
-          <a:lstStyle/>
-          <a:p>
-            <a:pPr lvl="0"/>
-            <a:r>
-              <a:rPr/>
-              <a:t>Validate tool</a:t>
-            </a:r>
-          </a:p>
-          <a:p>
-            <a:pPr lvl="1"/>
-            <a:r>
-              <a:rPr/>
-              <a:t>Ingest LDD files are part of the PDS4 information model, just like products. This means that the validator can run against them.</a:t>
-            </a:r>
-          </a:p>
-          <a:p>
-            <a:pPr lvl="0"/>
-            <a:r>
-              <a:rPr/>
-              <a:t>LDDTool</a:t>
-            </a:r>
-          </a:p>
-          <a:p>
-            <a:pPr lvl="1"/>
-            <a:r>
-              <a:rPr/>
-              <a:t>Catches many problems with a dictionary while it is being generated.</a:t>
-            </a:r>
-          </a:p>
-          <a:p>
-            <a:pPr lvl="0"/>
-            <a:r>
-              <a:rPr/>
-              <a:t>LDDPreflight</a:t>
-            </a:r>
-          </a:p>
-          <a:p>
-            <a:pPr lvl="1"/>
-            <a:r>
-              <a:rPr/>
-              <a:t>Runs several of the new rules proposed at this meeting, and displays any violations.</a:t>
-            </a:r>
-          </a:p>
-        </p:txBody>
-      </p:sp>
-    </p:spTree>
-  </p:cSld>
-</p:sld>
-</file>
-
 <file path=ppt/slides/slide12.xml><?xml version="1.0" encoding="utf-8"?>
 <p:sld xmlns:a="http://schemas.openxmlformats.org/drawingml/2006/main" xmlns:r="http://schemas.openxmlformats.org/officeDocument/2006/relationships" xmlns:p="http://schemas.openxmlformats.org/presentationml/2006/main">
   <p:cSld>
@@ -3532,7 +3567,7 @@
             </a:pPr>
             <a:r>
               <a:rPr/>
-              <a:t>Using static analysis tools</a:t>
+              <a:t>Static analysis tools</a:t>
             </a:r>
           </a:p>
         </p:txBody>
@@ -3555,7 +3590,42 @@
             <a:pPr lvl="0"/>
             <a:r>
               <a:rPr/>
-              <a:t>These should be run before the regression tests, since errors at this point are easier to catch, and some of them will prevent the dictionary from being generated, or will prevent regression tests from passing.</a:t>
+              <a:t>Validate tool</a:t>
+            </a:r>
+          </a:p>
+          <a:p>
+            <a:pPr lvl="1"/>
+            <a:r>
+              <a:rPr/>
+              <a:t>Ingest LDD files are part of the PDS4 information model, just like products. This means that the validator can run against them.</a:t>
+            </a:r>
+          </a:p>
+          <a:p>
+            <a:pPr lvl="0"/>
+            <a:r>
+              <a:rPr/>
+              <a:t>LDDTool</a:t>
+            </a:r>
+          </a:p>
+          <a:p>
+            <a:pPr lvl="1"/>
+            <a:r>
+              <a:rPr/>
+              <a:t>Catches many problems with a dictionary while it is being generated.</a:t>
+            </a:r>
+          </a:p>
+          <a:p>
+            <a:pPr lvl="0"/>
+            <a:r>
+              <a:rPr/>
+              <a:t>LDDPreflight</a:t>
+            </a:r>
+          </a:p>
+          <a:p>
+            <a:pPr lvl="1"/>
+            <a:r>
+              <a:rPr/>
+              <a:t>Runs several of the new rules proposed at this meeting, and displays any violations.</a:t>
             </a:r>
           </a:p>
         </p:txBody>
@@ -3566,6 +3636,76 @@
 </file>
 
 <file path=ppt/slides/slide13.xml><?xml version="1.0" encoding="utf-8"?>
+<p:sld xmlns:a="http://schemas.openxmlformats.org/drawingml/2006/main" xmlns:r="http://schemas.openxmlformats.org/officeDocument/2006/relationships" xmlns:p="http://schemas.openxmlformats.org/presentationml/2006/main">
+  <p:cSld>
+    <p:spTree>
+      <p:nvGrpSpPr>
+        <p:cNvPr id="1" name=""/>
+        <p:cNvGrpSpPr/>
+        <p:nvPr/>
+      </p:nvGrpSpPr>
+      <p:grpSpPr>
+        <a:xfrm>
+          <a:off x="0" y="0"/>
+          <a:ext cx="0" cy="0"/>
+          <a:chOff x="0" y="0"/>
+          <a:chExt cx="0" cy="0"/>
+        </a:xfrm>
+      </p:grpSpPr>
+      <p:sp>
+        <p:nvSpPr>
+          <p:cNvPr id="2" name="Title 1"/>
+          <p:cNvSpPr>
+            <a:spLocks noGrp="1"/>
+          </p:cNvSpPr>
+          <p:nvPr>
+            <p:ph type="title"/>
+          </p:nvPr>
+        </p:nvSpPr>
+        <p:spPr/>
+        <p:txBody>
+          <a:bodyPr/>
+          <a:lstStyle/>
+          <a:p>
+            <a:pPr lvl="0" indent="0" marL="0">
+              <a:buNone/>
+            </a:pPr>
+            <a:r>
+              <a:rPr/>
+              <a:t>Using static analysis tools</a:t>
+            </a:r>
+          </a:p>
+        </p:txBody>
+      </p:sp>
+      <p:sp>
+        <p:nvSpPr>
+          <p:cNvPr id="3" name="Content Placeholder 2"/>
+          <p:cNvSpPr>
+            <a:spLocks noGrp="1"/>
+          </p:cNvSpPr>
+          <p:nvPr>
+            <p:ph idx="1"/>
+          </p:nvPr>
+        </p:nvSpPr>
+        <p:spPr/>
+        <p:txBody>
+          <a:bodyPr/>
+          <a:lstStyle/>
+          <a:p>
+            <a:pPr lvl="0"/>
+            <a:r>
+              <a:rPr/>
+              <a:t>These should be run before the regression tests, since errors at this point are easier to catch, and some of them will prevent the dictionary from being generated, or will prevent regression tests from passing.</a:t>
+            </a:r>
+          </a:p>
+        </p:txBody>
+      </p:sp>
+    </p:spTree>
+  </p:cSld>
+</p:sld>
+</file>
+
+<file path=ppt/slides/slide14.xml><?xml version="1.0" encoding="utf-8"?>
 <p:sld xmlns:a="http://schemas.openxmlformats.org/drawingml/2006/main" xmlns:r="http://schemas.openxmlformats.org/officeDocument/2006/relationships" xmlns:p="http://schemas.openxmlformats.org/presentationml/2006/main">
   <p:cSld>
     <p:spTree>
@@ -3723,7 +3863,7 @@
 </p:sld>
 </file>
 
-<file path=ppt/slides/slide14.xml><?xml version="1.0" encoding="utf-8"?>
+<file path=ppt/slides/slide15.xml><?xml version="1.0" encoding="utf-8"?>
 <p:sld xmlns:a="http://schemas.openxmlformats.org/drawingml/2006/main" xmlns:r="http://schemas.openxmlformats.org/officeDocument/2006/relationships" xmlns:p="http://schemas.openxmlformats.org/presentationml/2006/main">
   <p:cSld>
     <p:spTree>
@@ -3874,7 +4014,7 @@
 </p:sld>
 </file>
 
-<file path=ppt/slides/slide15.xml><?xml version="1.0" encoding="utf-8"?>
+<file path=ppt/slides/slide16.xml><?xml version="1.0" encoding="utf-8"?>
 <p:sld xmlns:a="http://schemas.openxmlformats.org/drawingml/2006/main" xmlns:r="http://schemas.openxmlformats.org/officeDocument/2006/relationships" xmlns:p="http://schemas.openxmlformats.org/presentationml/2006/main">
   <p:cSld>
     <p:spTree>
@@ -3995,7 +4135,7 @@
 </p:sld>
 </file>
 
-<file path=ppt/slides/slide16.xml><?xml version="1.0" encoding="utf-8"?>
+<file path=ppt/slides/slide17.xml><?xml version="1.0" encoding="utf-8"?>
 <p:sld xmlns:a="http://schemas.openxmlformats.org/drawingml/2006/main" xmlns:r="http://schemas.openxmlformats.org/officeDocument/2006/relationships" xmlns:p="http://schemas.openxmlformats.org/presentationml/2006/main">
   <p:cSld>
     <p:spTree>
@@ -4175,57 +4315,50 @@
           <a:p>
             <a:pPr lvl="0"/>
             <a:r>
-              <a:rPr/>
-              <a:t>Passing tests provide examples of how the dictionary is used</a:t>
+              <a:rPr i="1"/>
+              <a:t>Ensure that the dictionary actually works the way you intend</a:t>
+            </a:r>
+          </a:p>
+          <a:p>
+            <a:pPr lvl="0"/>
+            <a:r>
+              <a:rPr/>
+              <a:t>Ensure that every class definition works as intended</a:t>
+            </a:r>
+          </a:p>
+          <a:p>
+            <a:pPr lvl="0"/>
+            <a:r>
+              <a:rPr/>
+              <a:t>Ensures that Schematron tests are running</a:t>
             </a:r>
           </a:p>
           <a:p>
             <a:pPr lvl="1"/>
             <a:r>
               <a:rPr/>
-              <a:t>This is not a substitute for documentation, but can supplement it</a:t>
+              <a:t>Ensures that your Schematron rules are correct</a:t>
             </a:r>
           </a:p>
           <a:p>
             <a:pPr lvl="0"/>
             <a:r>
               <a:rPr/>
-              <a:t>Ensure that every class definition works as intended</a:t>
+              <a:t>Prevent regressions</a:t>
+            </a:r>
+          </a:p>
+          <a:p>
+            <a:pPr lvl="1"/>
+            <a:r>
+              <a:rPr/>
+              <a:t>Regressions are unintended side-effects created by making changes</a:t>
             </a:r>
           </a:p>
           <a:p>
             <a:pPr lvl="0"/>
             <a:r>
               <a:rPr/>
-              <a:t>Ensures that Schematron tests are running</a:t>
-            </a:r>
-          </a:p>
-          <a:p>
-            <a:pPr lvl="1"/>
-            <a:r>
-              <a:rPr/>
-              <a:t>Ensures that your Schematron rules are correct</a:t>
-            </a:r>
-          </a:p>
-          <a:p>
-            <a:pPr lvl="0"/>
-            <a:r>
-              <a:rPr/>
-              <a:t>Prevent regressions</a:t>
-            </a:r>
-          </a:p>
-          <a:p>
-            <a:pPr lvl="1"/>
-            <a:r>
-              <a:rPr/>
-              <a:t>Regressions are unintended side-effects created by making changes</a:t>
-            </a:r>
-          </a:p>
-          <a:p>
-            <a:pPr lvl="0"/>
-            <a:r>
-              <a:rPr/>
-              <a:t>Warns if changes are not backwards-compatible</a:t>
+              <a:t>Provides early-warning if changes are not backwards-compatible</a:t>
             </a:r>
           </a:p>
         </p:txBody>
@@ -4482,7 +4615,7 @@
             </a:pPr>
             <a:r>
               <a:rPr/>
-              <a:t>Demonstration - Pushing a dictionary to GitHub</a:t>
+              <a:t>Running Tests without GitHub</a:t>
             </a:r>
           </a:p>
         </p:txBody>
@@ -4502,29 +4635,52 @@
           <a:bodyPr/>
           <a:lstStyle/>
           <a:p>
-            <a:pPr lvl="0" indent="0" marL="0">
-              <a:spcBef>
-                <a:spcPts val="3000"/>
-              </a:spcBef>
-              <a:buNone/>
-            </a:pPr>
-            <a:r>
-              <a:rPr b="1"/>
-              <a:t>Objectives</a:t>
-            </a:r>
-          </a:p>
-          <a:p>
             <a:pPr lvl="0"/>
             <a:r>
               <a:rPr/>
-              <a:t>Show tests in progress</a:t>
+              <a:t>You can do this, but it is currently a manual process</a:t>
             </a:r>
           </a:p>
           <a:p>
             <a:pPr lvl="0"/>
             <a:r>
               <a:rPr/>
-              <a:t>Show test results</a:t>
+              <a:t>Build the data dictionary with LDDTool</a:t>
+            </a:r>
+          </a:p>
+          <a:p>
+            <a:pPr lvl="0"/>
+            <a:r>
+              <a:rPr/>
+              <a:t>Run the validate tool on each label in the test directory</a:t>
+            </a:r>
+          </a:p>
+          <a:p>
+            <a:pPr lvl="1"/>
+            <a:r>
+              <a:rPr/>
+              <a:t>It would be easier to run the valid and invalid label tests separately</a:t>
+            </a:r>
+          </a:p>
+          <a:p>
+            <a:pPr lvl="0"/>
+            <a:r>
+              <a:rPr/>
+              <a:t>Examine the output</a:t>
+            </a:r>
+          </a:p>
+          <a:p>
+            <a:pPr lvl="0"/>
+            <a:r>
+              <a:rPr/>
+              <a:t>Push to GitHub if everything passes</a:t>
+            </a:r>
+          </a:p>
+          <a:p>
+            <a:pPr lvl="1"/>
+            <a:r>
+              <a:rPr/>
+              <a:t>To developers, this is known as not breaking the build</a:t>
             </a:r>
           </a:p>
         </p:txBody>
@@ -4571,7 +4727,7 @@
             </a:pPr>
             <a:r>
               <a:rPr/>
-              <a:t>What types of tests are there?</a:t>
+              <a:t>Demonstration - Pushing a dictionary to GitHub</a:t>
             </a:r>
           </a:p>
         </p:txBody>
@@ -4591,17 +4747,29 @@
           <a:bodyPr/>
           <a:lstStyle/>
           <a:p>
+            <a:pPr lvl="0" indent="0" marL="0">
+              <a:spcBef>
+                <a:spcPts val="3000"/>
+              </a:spcBef>
+              <a:buNone/>
+            </a:pPr>
+            <a:r>
+              <a:rPr b="1"/>
+              <a:t>Objectives</a:t>
+            </a:r>
+          </a:p>
+          <a:p>
             <a:pPr lvl="0"/>
             <a:r>
               <a:rPr/>
-              <a:t>Valid label tests will pass if the validator passes</a:t>
+              <a:t>Show tests in progress</a:t>
             </a:r>
           </a:p>
           <a:p>
             <a:pPr lvl="0"/>
             <a:r>
               <a:rPr/>
-              <a:t>Invalid label tests will pass if the validator fails</a:t>
+              <a:t>Show test results</a:t>
             </a:r>
           </a:p>
         </p:txBody>
@@ -4648,7 +4816,7 @@
             </a:pPr>
             <a:r>
               <a:rPr/>
-              <a:t>Valid Label (passing) tests</a:t>
+              <a:t>What types of tests are there?</a:t>
             </a:r>
           </a:p>
         </p:txBody>
@@ -4671,14 +4839,14 @@
             <a:pPr lvl="0"/>
             <a:r>
               <a:rPr/>
-              <a:t>These are meant to test situations where the label should work</a:t>
+              <a:t>Valid label tests will pass if the validator passes</a:t>
             </a:r>
           </a:p>
           <a:p>
             <a:pPr lvl="0"/>
             <a:r>
               <a:rPr/>
-              <a:t>These can consist of a variety of different labels that exercise each aspect of the dictionary</a:t>
+              <a:t>Invalid label tests will pass if the validator fails</a:t>
             </a:r>
           </a:p>
         </p:txBody>
@@ -4725,7 +4893,7 @@
             </a:pPr>
             <a:r>
               <a:rPr/>
-              <a:t>Invalid Label tests</a:t>
+              <a:t>Valid Label (passing) tests</a:t>
             </a:r>
           </a:p>
         </p:txBody>
@@ -4748,36 +4916,14 @@
             <a:pPr lvl="0"/>
             <a:r>
               <a:rPr/>
-              <a:t>These are meant to illustrate labels that are incorrect</a:t>
-            </a:r>
-          </a:p>
-          <a:p>
-            <a:pPr lvl="1"/>
-            <a:r>
-              <a:rPr/>
-              <a:t>You would use these to illustrate the type of labels that you </a:t>
-            </a:r>
-            <a:r>
-              <a:rPr i="1"/>
-              <a:t>do not</a:t>
-            </a:r>
-            <a:r>
-              <a:rPr/>
-              <a:t> want a data provider to create.</a:t>
-            </a:r>
-          </a:p>
-          <a:p>
-            <a:pPr lvl="1"/>
-            <a:r>
-              <a:rPr/>
-              <a:t>The could have incorrect values, be incomplete, or have too much (or conflicting) information.</a:t>
+              <a:t>These are meant to test situations where the label should work</a:t>
             </a:r>
           </a:p>
           <a:p>
             <a:pPr lvl="0"/>
             <a:r>
               <a:rPr/>
-              <a:t>Additionally, they will help detect if Schematron rules are not running</a:t>
+              <a:t>These can consist of a variety of different labels that exercise each aspect of the dictionary</a:t>
             </a:r>
           </a:p>
         </p:txBody>
@@ -4824,7 +4970,7 @@
             </a:pPr>
             <a:r>
               <a:rPr/>
-              <a:t>How do you write tests?</a:t>
+              <a:t>Invalid Label tests</a:t>
             </a:r>
           </a:p>
         </p:txBody>
@@ -4847,76 +4993,36 @@
             <a:pPr lvl="0"/>
             <a:r>
               <a:rPr/>
-              <a:t>Create a label</a:t>
+              <a:t>These are meant to illustrate labels that are incorrect</a:t>
             </a:r>
           </a:p>
           <a:p>
             <a:pPr lvl="1"/>
             <a:r>
               <a:rPr/>
-              <a:t>This could involve creating a completely synthetic label, or using an existing label</a:t>
+              <a:t>You would use these to illustrate the type of labels that you </a:t>
+            </a:r>
+            <a:r>
+              <a:rPr i="1"/>
+              <a:t>do not</a:t>
+            </a:r>
+            <a:r>
+              <a:rPr/>
+              <a:t> want a data provider to create.</a:t>
             </a:r>
           </a:p>
           <a:p>
             <a:pPr lvl="1"/>
             <a:r>
               <a:rPr/>
-              <a:t>The simpler the part that is not under test is, the better.</a:t>
-            </a:r>
-          </a:p>
-          <a:p>
-            <a:pPr lvl="2"/>
-            <a:r>
-              <a:rPr/>
-              <a:t>Parts that are not being tested just obscure the purpose of the test.</a:t>
+              <a:t>The could have incorrect values, be incomplete, or have too much (or conflicting) information.</a:t>
             </a:r>
           </a:p>
           <a:p>
             <a:pPr lvl="0"/>
             <a:r>
               <a:rPr/>
-              <a:t>If this is an invalid label test, introduce errors</a:t>
-            </a:r>
-          </a:p>
-          <a:p>
-            <a:pPr lvl="0"/>
-            <a:r>
-              <a:rPr/>
-              <a:t>Mark the label as a valid label test or an invalid label test</a:t>
-            </a:r>
-          </a:p>
-          <a:p>
-            <a:pPr lvl="1"/>
-            <a:r>
-              <a:rPr/>
-              <a:t>Add either </a:t>
-            </a:r>
-            <a:r>
-              <a:rPr>
-                <a:latin typeface="Courier"/>
-              </a:rPr>
-              <a:t>_VALID</a:t>
-            </a:r>
-            <a:r>
-              <a:rPr/>
-              <a:t> or </a:t>
-            </a:r>
-            <a:r>
-              <a:rPr>
-                <a:latin typeface="Courier"/>
-              </a:rPr>
-              <a:t>_FAIL</a:t>
-            </a:r>
-            <a:r>
-              <a:rPr/>
-              <a:t> to the end of the filename</a:t>
-            </a:r>
-          </a:p>
-          <a:p>
-            <a:pPr lvl="0"/>
-            <a:r>
-              <a:rPr/>
-              <a:t>Commit the label</a:t>
+              <a:t>Additionally, they will help detect if Schematron rules are not running</a:t>
             </a:r>
           </a:p>
         </p:txBody>

</xml_diff>